<commit_message>
tweak Zmodn.pptx; wordsmith PS_unit_interval
</commit_message>
<xml_diff>
--- a/spring13/slides13/Zmodn.pptx
+++ b/spring13/slides13/Zmodn.pptx
@@ -5,10 +5,10 @@
     <p:sldMasterId id="2147483678" r:id="rId1"/>
   </p:sldMasterIdLst>
   <p:notesMasterIdLst>
-    <p:notesMasterId r:id="rId32"/>
+    <p:notesMasterId r:id="rId33"/>
   </p:notesMasterIdLst>
   <p:handoutMasterIdLst>
-    <p:handoutMasterId r:id="rId33"/>
+    <p:handoutMasterId r:id="rId34"/>
   </p:handoutMasterIdLst>
   <p:sldIdLst>
     <p:sldId id="388" r:id="rId2"/>
@@ -35,17 +35,18 @@
     <p:sldId id="421" r:id="rId23"/>
     <p:sldId id="424" r:id="rId24"/>
     <p:sldId id="423" r:id="rId25"/>
-    <p:sldId id="420" r:id="rId26"/>
-    <p:sldId id="419" r:id="rId27"/>
-    <p:sldId id="399" r:id="rId28"/>
-    <p:sldId id="400" r:id="rId29"/>
-    <p:sldId id="401" r:id="rId30"/>
-    <p:sldId id="402" r:id="rId31"/>
+    <p:sldId id="426" r:id="rId26"/>
+    <p:sldId id="420" r:id="rId27"/>
+    <p:sldId id="419" r:id="rId28"/>
+    <p:sldId id="399" r:id="rId29"/>
+    <p:sldId id="400" r:id="rId30"/>
+    <p:sldId id="401" r:id="rId31"/>
+    <p:sldId id="402" r:id="rId32"/>
   </p:sldIdLst>
   <p:sldSz cx="9144000" cy="6858000" type="screen4x3"/>
   <p:notesSz cx="9601200" cy="7315200"/>
   <p:custDataLst>
-    <p:tags r:id="rId35"/>
+    <p:tags r:id="rId36"/>
   </p:custDataLst>
   <p:defaultTextStyle>
     <a:defPPr>
@@ -2539,7 +2540,7 @@
       </p:grpSpPr>
       <p:sp>
         <p:nvSpPr>
-          <p:cNvPr id="29698" name="Rectangle 7"/>
+          <p:cNvPr id="24578" name="Rectangle 7"/>
           <p:cNvSpPr>
             <a:spLocks noGrp="1" noChangeArrowheads="1"/>
           </p:cNvSpPr>
@@ -2554,7 +2555,7 @@
           <a:bodyPr/>
           <a:lstStyle/>
           <a:p>
-            <a:fld id="{B486D7DD-3D87-4D67-ACB2-B2DB69A39DA5}" type="slidenum">
+            <a:fld id="{D1D923D9-2B9B-4463-B111-DE85D4573044}" type="slidenum">
               <a:rPr lang="en-US" smtClean="0"/>
               <a:pPr/>
               <a:t>27</a:t>
@@ -2565,7 +2566,7 @@
       </p:sp>
       <p:sp>
         <p:nvSpPr>
-          <p:cNvPr id="29699" name="Rectangle 2"/>
+          <p:cNvPr id="24579" name="Rectangle 2"/>
           <p:cNvSpPr>
             <a:spLocks noGrp="1" noRot="1" noChangeAspect="1" noChangeArrowheads="1" noTextEdit="1"/>
           </p:cNvSpPr>
@@ -2579,7 +2580,7 @@
       </p:sp>
       <p:sp>
         <p:nvSpPr>
-          <p:cNvPr id="29700" name="Rectangle 3"/>
+          <p:cNvPr id="24580" name="Rectangle 3"/>
           <p:cNvSpPr>
             <a:spLocks noGrp="1" noChangeArrowheads="1"/>
           </p:cNvSpPr>
@@ -2596,7 +2597,7 @@
           <a:lstStyle/>
           <a:p>
             <a:pPr eaLnBrk="1" hangingPunct="1"/>
-            <a:endParaRPr lang="en-US" dirty="0" smtClean="0"/>
+            <a:endParaRPr lang="en-US" smtClean="0"/>
           </a:p>
         </p:txBody>
       </p:sp>
@@ -2684,7 +2685,7 @@
           <a:lstStyle/>
           <a:p>
             <a:pPr eaLnBrk="1" hangingPunct="1"/>
-            <a:endParaRPr lang="en-US" smtClean="0"/>
+            <a:endParaRPr lang="en-US" dirty="0" smtClean="0"/>
           </a:p>
         </p:txBody>
       </p:sp>
@@ -2910,6 +2911,94 @@
               <a:rPr lang="en-US" smtClean="0"/>
               <a:pPr/>
               <a:t>30</a:t>
+            </a:fld>
+            <a:endParaRPr lang="en-US" smtClean="0"/>
+          </a:p>
+        </p:txBody>
+      </p:sp>
+      <p:sp>
+        <p:nvSpPr>
+          <p:cNvPr id="29699" name="Rectangle 2"/>
+          <p:cNvSpPr>
+            <a:spLocks noGrp="1" noRot="1" noChangeAspect="1" noChangeArrowheads="1" noTextEdit="1"/>
+          </p:cNvSpPr>
+          <p:nvPr>
+            <p:ph type="sldImg"/>
+          </p:nvPr>
+        </p:nvSpPr>
+        <p:spPr>
+          <a:ln/>
+        </p:spPr>
+      </p:sp>
+      <p:sp>
+        <p:nvSpPr>
+          <p:cNvPr id="29700" name="Rectangle 3"/>
+          <p:cNvSpPr>
+            <a:spLocks noGrp="1" noChangeArrowheads="1"/>
+          </p:cNvSpPr>
+          <p:nvPr>
+            <p:ph type="body" idx="1"/>
+          </p:nvPr>
+        </p:nvSpPr>
+        <p:spPr>
+          <a:noFill/>
+          <a:ln/>
+        </p:spPr>
+        <p:txBody>
+          <a:bodyPr/>
+          <a:lstStyle/>
+          <a:p>
+            <a:pPr eaLnBrk="1" hangingPunct="1"/>
+            <a:endParaRPr lang="en-US" smtClean="0"/>
+          </a:p>
+        </p:txBody>
+      </p:sp>
+    </p:spTree>
+  </p:cSld>
+  <p:clrMapOvr>
+    <a:masterClrMapping/>
+  </p:clrMapOvr>
+</p:notes>
+</file>
+
+<file path=ppt/notesSlides/notesSlide31.xml><?xml version="1.0" encoding="utf-8"?>
+<p:notes xmlns:a="http://schemas.openxmlformats.org/drawingml/2006/main" xmlns:r="http://schemas.openxmlformats.org/officeDocument/2006/relationships" xmlns:p="http://schemas.openxmlformats.org/presentationml/2006/main">
+  <p:cSld>
+    <p:spTree>
+      <p:nvGrpSpPr>
+        <p:cNvPr id="1" name=""/>
+        <p:cNvGrpSpPr/>
+        <p:nvPr/>
+      </p:nvGrpSpPr>
+      <p:grpSpPr>
+        <a:xfrm>
+          <a:off x="0" y="0"/>
+          <a:ext cx="0" cy="0"/>
+          <a:chOff x="0" y="0"/>
+          <a:chExt cx="0" cy="0"/>
+        </a:xfrm>
+      </p:grpSpPr>
+      <p:sp>
+        <p:nvSpPr>
+          <p:cNvPr id="29698" name="Rectangle 7"/>
+          <p:cNvSpPr>
+            <a:spLocks noGrp="1" noChangeArrowheads="1"/>
+          </p:cNvSpPr>
+          <p:nvPr>
+            <p:ph type="sldNum" sz="quarter" idx="5"/>
+          </p:nvPr>
+        </p:nvSpPr>
+        <p:spPr>
+          <a:noFill/>
+        </p:spPr>
+        <p:txBody>
+          <a:bodyPr/>
+          <a:lstStyle/>
+          <a:p>
+            <a:fld id="{B486D7DD-3D87-4D67-ACB2-B2DB69A39DA5}" type="slidenum">
+              <a:rPr lang="en-US" smtClean="0"/>
+              <a:pPr/>
+              <a:t>31</a:t>
             </a:fld>
             <a:endParaRPr lang="en-US" smtClean="0"/>
           </a:p>
@@ -5272,7 +5361,7 @@
           <a:graphicData uri="http://schemas.openxmlformats.org/presentationml/2006/ole">
             <mc:AlternateContent xmlns:mc="http://schemas.openxmlformats.org/markup-compatibility/2006">
               <mc:Choice xmlns:v="urn:schemas-microsoft-com:vml" Requires="v">
-                <p:oleObj spid="_x0000_s5130" name="Equation" r:id="rId4" imgW="203200" imgH="292100" progId="Equation.DSMT4">
+                <p:oleObj spid="_x0000_s5133" name="Equation" r:id="rId4" imgW="203200" imgH="292100" progId="Equation.DSMT4">
                   <p:embed/>
                 </p:oleObj>
               </mc:Choice>
@@ -5599,7 +5688,7 @@
           <a:graphicData uri="http://schemas.openxmlformats.org/presentationml/2006/ole">
             <mc:AlternateContent xmlns:mc="http://schemas.openxmlformats.org/markup-compatibility/2006">
               <mc:Choice xmlns:v="urn:schemas-microsoft-com:vml" Requires="v">
-                <p:oleObj spid="_x0000_s14368" name="Equation" r:id="rId4" imgW="203200" imgH="292100" progId="Equation.DSMT4">
+                <p:oleObj spid="_x0000_s14377" name="Equation" r:id="rId4" imgW="203200" imgH="292100" progId="Equation.DSMT4">
                   <p:embed/>
                 </p:oleObj>
               </mc:Choice>
@@ -5656,7 +5745,7 @@
           <a:graphicData uri="http://schemas.openxmlformats.org/presentationml/2006/ole">
             <mc:AlternateContent xmlns:mc="http://schemas.openxmlformats.org/markup-compatibility/2006">
               <mc:Choice xmlns:v="urn:schemas-microsoft-com:vml" Requires="v">
-                <p:oleObj spid="_x0000_s14369" name="Equation" r:id="rId6" imgW="139700" imgH="215900" progId="Equation.DSMT4">
+                <p:oleObj spid="_x0000_s14378" name="Equation" r:id="rId6" imgW="139700" imgH="215900" progId="Equation.DSMT4">
                   <p:embed/>
                 </p:oleObj>
               </mc:Choice>
@@ -5713,7 +5802,7 @@
           <a:graphicData uri="http://schemas.openxmlformats.org/presentationml/2006/ole">
             <mc:AlternateContent xmlns:mc="http://schemas.openxmlformats.org/markup-compatibility/2006">
               <mc:Choice xmlns:v="urn:schemas-microsoft-com:vml" Requires="v">
-                <p:oleObj spid="_x0000_s14370" name="Equation" r:id="rId8" imgW="1282700" imgH="292100" progId="Equation.DSMT4">
+                <p:oleObj spid="_x0000_s14379" name="Equation" r:id="rId8" imgW="1282700" imgH="292100" progId="Equation.DSMT4">
                   <p:embed/>
                 </p:oleObj>
               </mc:Choice>
@@ -5804,7 +5893,7 @@
           <a:graphicData uri="http://schemas.openxmlformats.org/presentationml/2006/ole">
             <mc:AlternateContent xmlns:mc="http://schemas.openxmlformats.org/markup-compatibility/2006">
               <mc:Choice xmlns:v="urn:schemas-microsoft-com:vml" Requires="v">
-                <p:oleObj spid="_x0000_s14371" name="Equation" r:id="rId10" imgW="1295400" imgH="292100" progId="Equation.DSMT4">
+                <p:oleObj spid="_x0000_s14380" name="Equation" r:id="rId10" imgW="1295400" imgH="292100" progId="Equation.DSMT4">
                   <p:embed/>
                 </p:oleObj>
               </mc:Choice>
@@ -6077,7 +6166,7 @@
           <a:graphicData uri="http://schemas.openxmlformats.org/presentationml/2006/ole">
             <mc:AlternateContent xmlns:mc="http://schemas.openxmlformats.org/markup-compatibility/2006">
               <mc:Choice xmlns:v="urn:schemas-microsoft-com:vml" Requires="v">
-                <p:oleObj spid="_x0000_s15383" name="Equation" r:id="rId4" imgW="139700" imgH="215900" progId="Equation.DSMT4">
+                <p:oleObj spid="_x0000_s15390" name="Equation" r:id="rId4" imgW="139700" imgH="215900" progId="Equation.DSMT4">
                   <p:embed/>
                 </p:oleObj>
               </mc:Choice>
@@ -6134,7 +6223,7 @@
           <a:graphicData uri="http://schemas.openxmlformats.org/presentationml/2006/ole">
             <mc:AlternateContent xmlns:mc="http://schemas.openxmlformats.org/markup-compatibility/2006">
               <mc:Choice xmlns:v="urn:schemas-microsoft-com:vml" Requires="v">
-                <p:oleObj spid="_x0000_s15384" name="Equation" r:id="rId6" imgW="1955800" imgH="533400" progId="Equation.DSMT4">
+                <p:oleObj spid="_x0000_s15391" name="Equation" r:id="rId6" imgW="1955800" imgH="533400" progId="Equation.DSMT4">
                   <p:embed/>
                 </p:oleObj>
               </mc:Choice>
@@ -6191,7 +6280,7 @@
           <a:graphicData uri="http://schemas.openxmlformats.org/presentationml/2006/ole">
             <mc:AlternateContent xmlns:mc="http://schemas.openxmlformats.org/markup-compatibility/2006">
               <mc:Choice xmlns:v="urn:schemas-microsoft-com:vml" Requires="v">
-                <p:oleObj spid="_x0000_s15385" name="Equation" r:id="rId8" imgW="1930400" imgH="812800" progId="Equation.DSMT4">
+                <p:oleObj spid="_x0000_s15392" name="Equation" r:id="rId8" imgW="1930400" imgH="812800" progId="Equation.DSMT4">
                   <p:embed/>
                 </p:oleObj>
               </mc:Choice>
@@ -6411,7 +6500,7 @@
           <a:graphicData uri="http://schemas.openxmlformats.org/presentationml/2006/ole">
             <mc:AlternateContent xmlns:mc="http://schemas.openxmlformats.org/markup-compatibility/2006">
               <mc:Choice xmlns:v="urn:schemas-microsoft-com:vml" Requires="v">
-                <p:oleObj spid="_x0000_s17426" name="Equation" r:id="rId4" imgW="139700" imgH="215900" progId="Equation.DSMT4">
+                <p:oleObj spid="_x0000_s17433" name="Equation" r:id="rId4" imgW="139700" imgH="215900" progId="Equation.DSMT4">
                   <p:embed/>
                 </p:oleObj>
               </mc:Choice>
@@ -6468,7 +6557,7 @@
           <a:graphicData uri="http://schemas.openxmlformats.org/presentationml/2006/ole">
             <mc:AlternateContent xmlns:mc="http://schemas.openxmlformats.org/markup-compatibility/2006">
               <mc:Choice xmlns:v="urn:schemas-microsoft-com:vml" Requires="v">
-                <p:oleObj spid="_x0000_s17427" name="Equation" r:id="rId6" imgW="1955800" imgH="533400" progId="Equation.DSMT4">
+                <p:oleObj spid="_x0000_s17434" name="Equation" r:id="rId6" imgW="1955800" imgH="533400" progId="Equation.DSMT4">
                   <p:embed/>
                 </p:oleObj>
               </mc:Choice>
@@ -6525,7 +6614,7 @@
           <a:graphicData uri="http://schemas.openxmlformats.org/presentationml/2006/ole">
             <mc:AlternateContent xmlns:mc="http://schemas.openxmlformats.org/markup-compatibility/2006">
               <mc:Choice xmlns:v="urn:schemas-microsoft-com:vml" Requires="v">
-                <p:oleObj spid="_x0000_s17428" name="Equation" r:id="rId8" imgW="812800" imgH="355600" progId="Equation.DSMT4">
+                <p:oleObj spid="_x0000_s17435" name="Equation" r:id="rId8" imgW="812800" imgH="355600" progId="Equation.DSMT4">
                   <p:embed/>
                 </p:oleObj>
               </mc:Choice>
@@ -6692,7 +6781,7 @@
           <a:graphicData uri="http://schemas.openxmlformats.org/presentationml/2006/ole">
             <mc:AlternateContent xmlns:mc="http://schemas.openxmlformats.org/markup-compatibility/2006">
               <mc:Choice xmlns:v="urn:schemas-microsoft-com:vml" Requires="v">
-                <p:oleObj spid="_x0000_s16407" name="Equation" r:id="rId4" imgW="114300" imgH="165100" progId="Equation.3">
+                <p:oleObj spid="_x0000_s16414" name="Equation" r:id="rId4" imgW="114300" imgH="165100" progId="Equation.3">
                   <p:embed/>
                 </p:oleObj>
               </mc:Choice>
@@ -6749,7 +6838,7 @@
           <a:graphicData uri="http://schemas.openxmlformats.org/presentationml/2006/ole">
             <mc:AlternateContent xmlns:mc="http://schemas.openxmlformats.org/markup-compatibility/2006">
               <mc:Choice xmlns:v="urn:schemas-microsoft-com:vml" Requires="v">
-                <p:oleObj spid="_x0000_s16408" name="Equation" r:id="rId6" imgW="939800" imgH="292100" progId="Equation.DSMT4">
+                <p:oleObj spid="_x0000_s16415" name="Equation" r:id="rId6" imgW="939800" imgH="292100" progId="Equation.DSMT4">
                   <p:embed/>
                 </p:oleObj>
               </mc:Choice>
@@ -6806,7 +6895,7 @@
           <a:graphicData uri="http://schemas.openxmlformats.org/presentationml/2006/ole">
             <mc:AlternateContent xmlns:mc="http://schemas.openxmlformats.org/markup-compatibility/2006">
               <mc:Choice xmlns:v="urn:schemas-microsoft-com:vml" Requires="v">
-                <p:oleObj spid="_x0000_s16409" name="Equation" r:id="rId8" imgW="736600" imgH="292100" progId="Equation.DSMT4">
+                <p:oleObj spid="_x0000_s16416" name="Equation" r:id="rId8" imgW="736600" imgH="292100" progId="Equation.DSMT4">
                   <p:embed/>
                 </p:oleObj>
               </mc:Choice>
@@ -7049,7 +7138,7 @@
           <a:graphicData uri="http://schemas.openxmlformats.org/presentationml/2006/ole">
             <mc:AlternateContent xmlns:mc="http://schemas.openxmlformats.org/markup-compatibility/2006">
               <mc:Choice xmlns:v="urn:schemas-microsoft-com:vml" Requires="v">
-                <p:oleObj spid="_x0000_s18463" name="Equation" r:id="rId4" imgW="114300" imgH="165100" progId="Equation.3">
+                <p:oleObj spid="_x0000_s18472" name="Equation" r:id="rId4" imgW="114300" imgH="165100" progId="Equation.3">
                   <p:embed/>
                 </p:oleObj>
               </mc:Choice>
@@ -7106,7 +7195,7 @@
           <a:graphicData uri="http://schemas.openxmlformats.org/presentationml/2006/ole">
             <mc:AlternateContent xmlns:mc="http://schemas.openxmlformats.org/markup-compatibility/2006">
               <mc:Choice xmlns:v="urn:schemas-microsoft-com:vml" Requires="v">
-                <p:oleObj spid="_x0000_s18464" name="Equation" r:id="rId6" imgW="469900" imgH="304800" progId="Equation.3">
+                <p:oleObj spid="_x0000_s18473" name="Equation" r:id="rId6" imgW="469900" imgH="304800" progId="Equation.3">
                   <p:embed/>
                 </p:oleObj>
               </mc:Choice>
@@ -7163,7 +7252,7 @@
           <a:graphicData uri="http://schemas.openxmlformats.org/presentationml/2006/ole">
             <mc:AlternateContent xmlns:mc="http://schemas.openxmlformats.org/markup-compatibility/2006">
               <mc:Choice xmlns:v="urn:schemas-microsoft-com:vml" Requires="v">
-                <p:oleObj spid="_x0000_s18465" name="Equation" r:id="rId8" imgW="596900" imgH="330200" progId="Equation.DSMT4">
+                <p:oleObj spid="_x0000_s18474" name="Equation" r:id="rId8" imgW="596900" imgH="330200" progId="Equation.DSMT4">
                   <p:embed/>
                 </p:oleObj>
               </mc:Choice>
@@ -7220,7 +7309,7 @@
           <a:graphicData uri="http://schemas.openxmlformats.org/presentationml/2006/ole">
             <mc:AlternateContent xmlns:mc="http://schemas.openxmlformats.org/markup-compatibility/2006">
               <mc:Choice xmlns:v="urn:schemas-microsoft-com:vml" Requires="v">
-                <p:oleObj spid="_x0000_s18466" name="Equation" r:id="rId10" imgW="787400" imgH="292100" progId="Equation.DSMT4">
+                <p:oleObj spid="_x0000_s18475" name="Equation" r:id="rId10" imgW="787400" imgH="292100" progId="Equation.DSMT4">
                   <p:embed/>
                 </p:oleObj>
               </mc:Choice>
@@ -7516,7 +7605,7 @@
           <a:graphicData uri="http://schemas.openxmlformats.org/presentationml/2006/ole">
             <mc:AlternateContent xmlns:mc="http://schemas.openxmlformats.org/markup-compatibility/2006">
               <mc:Choice xmlns:v="urn:schemas-microsoft-com:vml" Requires="v">
-                <p:oleObj spid="_x0000_s19477" name="Equation" r:id="rId4" imgW="114300" imgH="165100" progId="Equation.3">
+                <p:oleObj spid="_x0000_s19484" name="Equation" r:id="rId4" imgW="114300" imgH="165100" progId="Equation.3">
                   <p:embed/>
                 </p:oleObj>
               </mc:Choice>
@@ -7573,7 +7662,7 @@
           <a:graphicData uri="http://schemas.openxmlformats.org/presentationml/2006/ole">
             <mc:AlternateContent xmlns:mc="http://schemas.openxmlformats.org/markup-compatibility/2006">
               <mc:Choice xmlns:v="urn:schemas-microsoft-com:vml" Requires="v">
-                <p:oleObj spid="_x0000_s19478" name="Equation" r:id="rId6" imgW="596900" imgH="330200" progId="Equation.DSMT4">
+                <p:oleObj spid="_x0000_s19485" name="Equation" r:id="rId6" imgW="596900" imgH="330200" progId="Equation.DSMT4">
                   <p:embed/>
                 </p:oleObj>
               </mc:Choice>
@@ -7630,7 +7719,7 @@
           <a:graphicData uri="http://schemas.openxmlformats.org/presentationml/2006/ole">
             <mc:AlternateContent xmlns:mc="http://schemas.openxmlformats.org/markup-compatibility/2006">
               <mc:Choice xmlns:v="urn:schemas-microsoft-com:vml" Requires="v">
-                <p:oleObj spid="_x0000_s19479" name="Equation" r:id="rId8" imgW="1689100" imgH="673100" progId="Equation.DSMT4">
+                <p:oleObj spid="_x0000_s19486" name="Equation" r:id="rId8" imgW="1689100" imgH="673100" progId="Equation.DSMT4">
                   <p:embed/>
                 </p:oleObj>
               </mc:Choice>
@@ -7797,7 +7886,7 @@
           <a:graphicData uri="http://schemas.openxmlformats.org/presentationml/2006/ole">
             <mc:AlternateContent xmlns:mc="http://schemas.openxmlformats.org/markup-compatibility/2006">
               <mc:Choice xmlns:v="urn:schemas-microsoft-com:vml" Requires="v">
-                <p:oleObj spid="_x0000_s20502" name="Equation" r:id="rId4" imgW="114300" imgH="165100" progId="Equation.3">
+                <p:oleObj spid="_x0000_s20509" name="Equation" r:id="rId4" imgW="114300" imgH="165100" progId="Equation.3">
                   <p:embed/>
                 </p:oleObj>
               </mc:Choice>
@@ -7854,7 +7943,7 @@
           <a:graphicData uri="http://schemas.openxmlformats.org/presentationml/2006/ole">
             <mc:AlternateContent xmlns:mc="http://schemas.openxmlformats.org/markup-compatibility/2006">
               <mc:Choice xmlns:v="urn:schemas-microsoft-com:vml" Requires="v">
-                <p:oleObj spid="_x0000_s20503" name="Equation" r:id="rId6" imgW="1485900" imgH="292100" progId="Equation.DSMT4">
+                <p:oleObj spid="_x0000_s20510" name="Equation" r:id="rId6" imgW="1485900" imgH="292100" progId="Equation.DSMT4">
                   <p:embed/>
                 </p:oleObj>
               </mc:Choice>
@@ -7911,7 +8000,7 @@
           <a:graphicData uri="http://schemas.openxmlformats.org/presentationml/2006/ole">
             <mc:AlternateContent xmlns:mc="http://schemas.openxmlformats.org/markup-compatibility/2006">
               <mc:Choice xmlns:v="urn:schemas-microsoft-com:vml" Requires="v">
-                <p:oleObj spid="_x0000_s20504" name="Equation" r:id="rId8" imgW="863600" imgH="292100" progId="Equation.DSMT4">
+                <p:oleObj spid="_x0000_s20511" name="Equation" r:id="rId8" imgW="863600" imgH="292100" progId="Equation.DSMT4">
                   <p:embed/>
                 </p:oleObj>
               </mc:Choice>
@@ -8154,7 +8243,7 @@
           <a:graphicData uri="http://schemas.openxmlformats.org/presentationml/2006/ole">
             <mc:AlternateContent xmlns:mc="http://schemas.openxmlformats.org/markup-compatibility/2006">
               <mc:Choice xmlns:v="urn:schemas-microsoft-com:vml" Requires="v">
-                <p:oleObj spid="_x0000_s21528" name="Equation" r:id="rId4" imgW="114300" imgH="165100" progId="Equation.3">
+                <p:oleObj spid="_x0000_s21535" name="Equation" r:id="rId4" imgW="114300" imgH="165100" progId="Equation.3">
                   <p:embed/>
                 </p:oleObj>
               </mc:Choice>
@@ -8211,7 +8300,7 @@
           <a:graphicData uri="http://schemas.openxmlformats.org/presentationml/2006/ole">
             <mc:AlternateContent xmlns:mc="http://schemas.openxmlformats.org/markup-compatibility/2006">
               <mc:Choice xmlns:v="urn:schemas-microsoft-com:vml" Requires="v">
-                <p:oleObj spid="_x0000_s21529" name="Equation" r:id="rId6" imgW="762000" imgH="292100" progId="Equation.DSMT4">
+                <p:oleObj spid="_x0000_s21536" name="Equation" r:id="rId6" imgW="762000" imgH="292100" progId="Equation.DSMT4">
                   <p:embed/>
                 </p:oleObj>
               </mc:Choice>
@@ -8268,7 +8357,7 @@
           <a:graphicData uri="http://schemas.openxmlformats.org/presentationml/2006/ole">
             <mc:AlternateContent xmlns:mc="http://schemas.openxmlformats.org/markup-compatibility/2006">
               <mc:Choice xmlns:v="urn:schemas-microsoft-com:vml" Requires="v">
-                <p:oleObj spid="_x0000_s21530" name="Equation" r:id="rId8" imgW="635000" imgH="292100" progId="Equation.DSMT4">
+                <p:oleObj spid="_x0000_s21537" name="Equation" r:id="rId8" imgW="635000" imgH="292100" progId="Equation.DSMT4">
                   <p:embed/>
                 </p:oleObj>
               </mc:Choice>
@@ -8809,7 +8898,7 @@
           <a:graphicData uri="http://schemas.openxmlformats.org/presentationml/2006/ole">
             <mc:AlternateContent xmlns:mc="http://schemas.openxmlformats.org/markup-compatibility/2006">
               <mc:Choice xmlns:v="urn:schemas-microsoft-com:vml" Requires="v">
-                <p:oleObj spid="_x0000_s28684" name="Equation" r:id="rId4" imgW="368300" imgH="292100" progId="Equation.DSMT4">
+                <p:oleObj spid="_x0000_s28689" name="Equation" r:id="rId4" imgW="368300" imgH="292100" progId="Equation.DSMT4">
                   <p:embed/>
                 </p:oleObj>
               </mc:Choice>
@@ -8933,7 +9022,7 @@
             <a:graphicData uri="http://schemas.openxmlformats.org/presentationml/2006/ole">
               <mc:AlternateContent xmlns:mc="http://schemas.openxmlformats.org/markup-compatibility/2006">
                 <mc:Choice xmlns:v="urn:schemas-microsoft-com:vml" Requires="v">
-                  <p:oleObj spid="_x0000_s28685" name="Equation" r:id="rId6" imgW="203200" imgH="292100" progId="Equation.DSMT4">
+                  <p:oleObj spid="_x0000_s28690" name="Equation" r:id="rId6" imgW="203200" imgH="292100" progId="Equation.DSMT4">
                     <p:embed/>
                   </p:oleObj>
                 </mc:Choice>
@@ -9828,7 +9917,7 @@
           <a:graphicData uri="http://schemas.openxmlformats.org/presentationml/2006/ole">
             <mc:AlternateContent xmlns:mc="http://schemas.openxmlformats.org/markup-compatibility/2006">
               <mc:Choice xmlns:v="urn:schemas-microsoft-com:vml" Requires="v">
-                <p:oleObj spid="_x0000_s29708" name="Equation" r:id="rId4" imgW="368300" imgH="292100" progId="Equation.DSMT4">
+                <p:oleObj spid="_x0000_s29713" name="Equation" r:id="rId4" imgW="368300" imgH="292100" progId="Equation.DSMT4">
                   <p:embed/>
                 </p:oleObj>
               </mc:Choice>
@@ -9952,7 +10041,7 @@
             <a:graphicData uri="http://schemas.openxmlformats.org/presentationml/2006/ole">
               <mc:AlternateContent xmlns:mc="http://schemas.openxmlformats.org/markup-compatibility/2006">
                 <mc:Choice xmlns:v="urn:schemas-microsoft-com:vml" Requires="v">
-                  <p:oleObj spid="_x0000_s29709" name="Equation" r:id="rId6" imgW="203200" imgH="292100" progId="Equation.DSMT4">
+                  <p:oleObj spid="_x0000_s29714" name="Equation" r:id="rId6" imgW="203200" imgH="292100" progId="Equation.DSMT4">
                     <p:embed/>
                   </p:oleObj>
                 </mc:Choice>
@@ -10059,7 +10148,7 @@
           <a:graphicData uri="http://schemas.openxmlformats.org/presentationml/2006/ole">
             <mc:AlternateContent xmlns:mc="http://schemas.openxmlformats.org/markup-compatibility/2006">
               <mc:Choice xmlns:v="urn:schemas-microsoft-com:vml" Requires="v">
-                <p:oleObj spid="_x0000_s6198" name="Equation" r:id="rId4" imgW="203200" imgH="292100" progId="Equation.DSMT4">
+                <p:oleObj spid="_x0000_s6207" name="Equation" r:id="rId4" imgW="203200" imgH="292100" progId="Equation.DSMT4">
                   <p:embed/>
                 </p:oleObj>
               </mc:Choice>
@@ -10267,7 +10356,7 @@
           <a:graphicData uri="http://schemas.openxmlformats.org/presentationml/2006/ole">
             <mc:AlternateContent xmlns:mc="http://schemas.openxmlformats.org/markup-compatibility/2006">
               <mc:Choice xmlns:v="urn:schemas-microsoft-com:vml" Requires="v">
-                <p:oleObj spid="_x0000_s6199" name="Equation" r:id="rId6" imgW="203200" imgH="292100" progId="Equation.DSMT4">
+                <p:oleObj spid="_x0000_s6208" name="Equation" r:id="rId6" imgW="203200" imgH="292100" progId="Equation.DSMT4">
                   <p:embed/>
                 </p:oleObj>
               </mc:Choice>
@@ -10387,7 +10476,7 @@
           <a:graphicData uri="http://schemas.openxmlformats.org/presentationml/2006/ole">
             <mc:AlternateContent xmlns:mc="http://schemas.openxmlformats.org/markup-compatibility/2006">
               <mc:Choice xmlns:v="urn:schemas-microsoft-com:vml" Requires="v">
-                <p:oleObj spid="_x0000_s6200" name="Equation" r:id="rId8" imgW="1943100" imgH="558800" progId="Equation.DSMT4">
+                <p:oleObj spid="_x0000_s6209" name="Equation" r:id="rId8" imgW="1943100" imgH="558800" progId="Equation.DSMT4">
                   <p:embed/>
                 </p:oleObj>
               </mc:Choice>
@@ -10444,7 +10533,7 @@
           <a:graphicData uri="http://schemas.openxmlformats.org/presentationml/2006/ole">
             <mc:AlternateContent xmlns:mc="http://schemas.openxmlformats.org/markup-compatibility/2006">
               <mc:Choice xmlns:v="urn:schemas-microsoft-com:vml" Requires="v">
-                <p:oleObj spid="_x0000_s6201" name="Equation" r:id="rId10" imgW="660400" imgH="292100" progId="Equation.DSMT4">
+                <p:oleObj spid="_x0000_s6210" name="Equation" r:id="rId10" imgW="660400" imgH="292100" progId="Equation.DSMT4">
                   <p:embed/>
                 </p:oleObj>
               </mc:Choice>
@@ -11670,7 +11759,7 @@
             <a:graphicData uri="http://schemas.openxmlformats.org/presentationml/2006/ole">
               <mc:AlternateContent xmlns:mc="http://schemas.openxmlformats.org/markup-compatibility/2006">
                 <mc:Choice xmlns:v="urn:schemas-microsoft-com:vml" Requires="v">
-                  <p:oleObj spid="_x0000_s30733" name="Equation" r:id="rId4" imgW="203200" imgH="292100" progId="Equation.DSMT4">
+                  <p:oleObj spid="_x0000_s30738" name="Equation" r:id="rId4" imgW="203200" imgH="292100" progId="Equation.DSMT4">
                     <p:embed/>
                   </p:oleObj>
                 </mc:Choice>
@@ -11728,7 +11817,7 @@
           <a:graphicData uri="http://schemas.openxmlformats.org/presentationml/2006/ole">
             <mc:AlternateContent xmlns:mc="http://schemas.openxmlformats.org/markup-compatibility/2006">
               <mc:Choice xmlns:v="urn:schemas-microsoft-com:vml" Requires="v">
-                <p:oleObj spid="_x0000_s30734" name="Equation" r:id="rId6" imgW="368300" imgH="292100" progId="Equation.DSMT4">
+                <p:oleObj spid="_x0000_s30739" name="Equation" r:id="rId6" imgW="368300" imgH="292100" progId="Equation.DSMT4">
                   <p:embed/>
                 </p:oleObj>
               </mc:Choice>
@@ -11895,7 +11984,7 @@
           <a:graphicData uri="http://schemas.openxmlformats.org/presentationml/2006/ole">
             <mc:AlternateContent xmlns:mc="http://schemas.openxmlformats.org/markup-compatibility/2006">
               <mc:Choice xmlns:v="urn:schemas-microsoft-com:vml" Requires="v">
-                <p:oleObj spid="_x0000_s34817" name="Equation" r:id="rId4" imgW="114300" imgH="165100" progId="Equation.3">
+                <p:oleObj spid="_x0000_s34824" name="Equation" r:id="rId4" imgW="114300" imgH="165100" progId="Equation.3">
                   <p:embed/>
                 </p:oleObj>
               </mc:Choice>
@@ -11952,7 +12041,7 @@
           <a:graphicData uri="http://schemas.openxmlformats.org/presentationml/2006/ole">
             <mc:AlternateContent xmlns:mc="http://schemas.openxmlformats.org/markup-compatibility/2006">
               <mc:Choice xmlns:v="urn:schemas-microsoft-com:vml" Requires="v">
-                <p:oleObj spid="_x0000_s34818" name="Equation" r:id="rId6" imgW="762000" imgH="292100" progId="Equation.DSMT4">
+                <p:oleObj spid="_x0000_s34825" name="Equation" r:id="rId6" imgW="762000" imgH="292100" progId="Equation.DSMT4">
                   <p:embed/>
                 </p:oleObj>
               </mc:Choice>
@@ -12009,7 +12098,7 @@
           <a:graphicData uri="http://schemas.openxmlformats.org/presentationml/2006/ole">
             <mc:AlternateContent xmlns:mc="http://schemas.openxmlformats.org/markup-compatibility/2006">
               <mc:Choice xmlns:v="urn:schemas-microsoft-com:vml" Requires="v">
-                <p:oleObj spid="_x0000_s34819" name="Equation" r:id="rId8" imgW="635000" imgH="292100" progId="Equation.DSMT4">
+                <p:oleObj spid="_x0000_s34826" name="Equation" r:id="rId8" imgW="635000" imgH="292100" progId="Equation.DSMT4">
                   <p:embed/>
                 </p:oleObj>
               </mc:Choice>
@@ -12167,7 +12256,7 @@
           <a:graphicData uri="http://schemas.openxmlformats.org/presentationml/2006/ole">
             <mc:AlternateContent xmlns:mc="http://schemas.openxmlformats.org/markup-compatibility/2006">
               <mc:Choice xmlns:v="urn:schemas-microsoft-com:vml" Requires="v">
-                <p:oleObj spid="_x0000_s24595" name="Equation" r:id="rId4" imgW="114300" imgH="165100" progId="Equation.3">
+                <p:oleObj spid="_x0000_s24600" name="Equation" r:id="rId4" imgW="114300" imgH="165100" progId="Equation.3">
                   <p:embed/>
                 </p:oleObj>
               </mc:Choice>
@@ -12224,7 +12313,7 @@
           <a:graphicData uri="http://schemas.openxmlformats.org/presentationml/2006/ole">
             <mc:AlternateContent xmlns:mc="http://schemas.openxmlformats.org/markup-compatibility/2006">
               <mc:Choice xmlns:v="urn:schemas-microsoft-com:vml" Requires="v">
-                <p:oleObj spid="_x0000_s24596" name="Equation" r:id="rId6" imgW="990600" imgH="292100" progId="Equation.DSMT4">
+                <p:oleObj spid="_x0000_s24601" name="Equation" r:id="rId6" imgW="990600" imgH="292100" progId="Equation.DSMT4">
                   <p:embed/>
                 </p:oleObj>
               </mc:Choice>
@@ -12259,6 +12348,67 @@
           </a:graphicData>
         </a:graphic>
       </p:graphicFrame>
+      <p:cxnSp>
+        <p:nvCxnSpPr>
+          <p:cNvPr id="5" name="Curved Connector 4"/>
+          <p:cNvCxnSpPr/>
+          <p:nvPr/>
+        </p:nvCxnSpPr>
+        <p:spPr bwMode="auto">
+          <a:xfrm rot="16200000" flipH="1">
+            <a:off x="1638300" y="3238500"/>
+            <a:ext cx="1981200" cy="1143000"/>
+          </a:xfrm>
+          <a:prstGeom prst="curvedConnector3">
+            <a:avLst/>
+          </a:prstGeom>
+          <a:noFill/>
+          <a:ln w="38100" cap="flat" cmpd="sng" algn="ctr">
+            <a:solidFill>
+              <a:schemeClr val="tx1"/>
+            </a:solidFill>
+            <a:prstDash val="sysDash"/>
+            <a:round/>
+            <a:headEnd type="stealth" w="lg" len="lg"/>
+            <a:tailEnd type="none" w="lg" len="lg"/>
+          </a:ln>
+          <a:effectLst/>
+        </p:spPr>
+      </p:cxnSp>
+      <p:sp>
+        <p:nvSpPr>
+          <p:cNvPr id="8" name="TextBox 7"/>
+          <p:cNvSpPr txBox="1"/>
+          <p:nvPr/>
+        </p:nvSpPr>
+        <p:spPr>
+          <a:xfrm>
+            <a:off x="1998444" y="4648200"/>
+            <a:ext cx="2421156" cy="830997"/>
+          </a:xfrm>
+          <a:prstGeom prst="rect">
+            <a:avLst/>
+          </a:prstGeom>
+          <a:noFill/>
+        </p:spPr>
+        <p:txBody>
+          <a:bodyPr wrap="none" rtlCol="0">
+            <a:spAutoFit/>
+          </a:bodyPr>
+          <a:lstStyle/>
+          <a:p>
+            <a:r>
+              <a:rPr lang="en-US" sz="4800" dirty="0" smtClean="0">
+                <a:latin typeface="+mj-lt"/>
+              </a:rPr>
+              <a:t>product</a:t>
+            </a:r>
+            <a:endParaRPr lang="en-US" sz="4800" dirty="0" smtClean="0">
+              <a:latin typeface="+mj-lt"/>
+            </a:endParaRPr>
+          </a:p>
+        </p:txBody>
+      </p:sp>
     </p:spTree>
     <p:extLst>
       <p:ext uri="{BB962C8B-B14F-4D97-AF65-F5344CB8AC3E}">
@@ -12275,9 +12425,123 @@
   <p:timing>
     <p:tnLst>
       <p:par>
-        <p:cTn xmlns:p14="http://schemas.microsoft.com/office/powerpoint/2010/main" id="1" dur="indefinite" restart="never" nodeType="tmRoot"/>
+        <p:cTn xmlns:p14="http://schemas.microsoft.com/office/powerpoint/2010/main" id="1" dur="indefinite" restart="never" nodeType="tmRoot">
+          <p:childTnLst>
+            <p:seq concurrent="1" nextAc="seek">
+              <p:cTn id="2" dur="indefinite" nodeType="mainSeq">
+                <p:childTnLst>
+                  <p:par>
+                    <p:cTn id="3" fill="hold">
+                      <p:stCondLst>
+                        <p:cond delay="indefinite"/>
+                      </p:stCondLst>
+                      <p:childTnLst>
+                        <p:par>
+                          <p:cTn id="4" fill="hold">
+                            <p:stCondLst>
+                              <p:cond delay="0"/>
+                            </p:stCondLst>
+                            <p:childTnLst>
+                              <p:par>
+                                <p:cTn id="5" presetID="10" presetClass="entr" presetSubtype="0" fill="hold" grpId="0" nodeType="clickEffect">
+                                  <p:stCondLst>
+                                    <p:cond delay="0"/>
+                                  </p:stCondLst>
+                                  <p:childTnLst>
+                                    <p:set>
+                                      <p:cBhvr>
+                                        <p:cTn id="6" dur="1" fill="hold">
+                                          <p:stCondLst>
+                                            <p:cond delay="0"/>
+                                          </p:stCondLst>
+                                        </p:cTn>
+                                        <p:tgtEl>
+                                          <p:spTgt spid="8"/>
+                                        </p:tgtEl>
+                                        <p:attrNameLst>
+                                          <p:attrName>style.visibility</p:attrName>
+                                        </p:attrNameLst>
+                                      </p:cBhvr>
+                                      <p:to>
+                                        <p:strVal val="visible"/>
+                                      </p:to>
+                                    </p:set>
+                                    <p:animEffect transition="in" filter="fade">
+                                      <p:cBhvr>
+                                        <p:cTn id="7" dur="500"/>
+                                        <p:tgtEl>
+                                          <p:spTgt spid="8"/>
+                                        </p:tgtEl>
+                                      </p:cBhvr>
+                                    </p:animEffect>
+                                  </p:childTnLst>
+                                </p:cTn>
+                              </p:par>
+                              <p:par>
+                                <p:cTn id="8" presetID="22" presetClass="entr" presetSubtype="4" fill="hold" nodeType="withEffect">
+                                  <p:stCondLst>
+                                    <p:cond delay="0"/>
+                                  </p:stCondLst>
+                                  <p:childTnLst>
+                                    <p:set>
+                                      <p:cBhvr>
+                                        <p:cTn id="9" dur="1" fill="hold">
+                                          <p:stCondLst>
+                                            <p:cond delay="0"/>
+                                          </p:stCondLst>
+                                        </p:cTn>
+                                        <p:tgtEl>
+                                          <p:spTgt spid="5"/>
+                                        </p:tgtEl>
+                                        <p:attrNameLst>
+                                          <p:attrName>style.visibility</p:attrName>
+                                        </p:attrNameLst>
+                                      </p:cBhvr>
+                                      <p:to>
+                                        <p:strVal val="visible"/>
+                                      </p:to>
+                                    </p:set>
+                                    <p:animEffect transition="in" filter="wipe(down)">
+                                      <p:cBhvr>
+                                        <p:cTn id="10" dur="1000"/>
+                                        <p:tgtEl>
+                                          <p:spTgt spid="5"/>
+                                        </p:tgtEl>
+                                      </p:cBhvr>
+                                    </p:animEffect>
+                                  </p:childTnLst>
+                                </p:cTn>
+                              </p:par>
+                            </p:childTnLst>
+                          </p:cTn>
+                        </p:par>
+                      </p:childTnLst>
+                    </p:cTn>
+                  </p:par>
+                </p:childTnLst>
+              </p:cTn>
+              <p:prevCondLst>
+                <p:cond evt="onPrev" delay="0">
+                  <p:tgtEl>
+                    <p:sldTgt/>
+                  </p:tgtEl>
+                </p:cond>
+              </p:prevCondLst>
+              <p:nextCondLst>
+                <p:cond evt="onNext" delay="0">
+                  <p:tgtEl>
+                    <p:sldTgt/>
+                  </p:tgtEl>
+                </p:cond>
+              </p:nextCondLst>
+            </p:seq>
+          </p:childTnLst>
+        </p:cTn>
       </p:par>
     </p:tnLst>
+    <p:bldLst>
+      <p:bldP spid="8" grpId="0"/>
+    </p:bldLst>
   </p:timing>
 </p:sld>
 </file>
@@ -12359,7 +12623,7 @@
           <a:graphicData uri="http://schemas.openxmlformats.org/presentationml/2006/ole">
             <mc:AlternateContent xmlns:mc="http://schemas.openxmlformats.org/markup-compatibility/2006">
               <mc:Choice xmlns:v="urn:schemas-microsoft-com:vml" Requires="v">
-                <p:oleObj spid="_x0000_s27661" name="Equation" r:id="rId4" imgW="114300" imgH="165100" progId="Equation.3">
+                <p:oleObj spid="_x0000_s27666" name="Equation" r:id="rId4" imgW="114300" imgH="165100" progId="Equation.3">
                   <p:embed/>
                 </p:oleObj>
               </mc:Choice>
@@ -12416,7 +12680,7 @@
           <a:graphicData uri="http://schemas.openxmlformats.org/presentationml/2006/ole">
             <mc:AlternateContent xmlns:mc="http://schemas.openxmlformats.org/markup-compatibility/2006">
               <mc:Choice xmlns:v="urn:schemas-microsoft-com:vml" Requires="v">
-                <p:oleObj spid="_x0000_s27662" name="Equation" r:id="rId6" imgW="1231900" imgH="558800" progId="Equation.DSMT4">
+                <p:oleObj spid="_x0000_s27667" name="Equation" r:id="rId6" imgW="1231900" imgH="558800" progId="Equation.DSMT4">
                   <p:embed/>
                 </p:oleObj>
               </mc:Choice>
@@ -12588,7 +12852,7 @@
           <a:graphicData uri="http://schemas.openxmlformats.org/presentationml/2006/ole">
             <mc:AlternateContent xmlns:mc="http://schemas.openxmlformats.org/markup-compatibility/2006">
               <mc:Choice xmlns:v="urn:schemas-microsoft-com:vml" Requires="v">
-                <p:oleObj spid="_x0000_s26638" name="Equation" r:id="rId4" imgW="114300" imgH="165100" progId="Equation.3">
+                <p:oleObj spid="_x0000_s26643" name="Equation" r:id="rId4" imgW="114300" imgH="165100" progId="Equation.3">
                   <p:embed/>
                 </p:oleObj>
               </mc:Choice>
@@ -12645,7 +12909,7 @@
           <a:graphicData uri="http://schemas.openxmlformats.org/presentationml/2006/ole">
             <mc:AlternateContent xmlns:mc="http://schemas.openxmlformats.org/markup-compatibility/2006">
               <mc:Choice xmlns:v="urn:schemas-microsoft-com:vml" Requires="v">
-                <p:oleObj spid="_x0000_s26639" name="Equation" r:id="rId6" imgW="1206500" imgH="558800" progId="Equation.3">
+                <p:oleObj spid="_x0000_s26644" name="Equation" r:id="rId6" imgW="1206500" imgH="558800" progId="Equation.3">
                   <p:embed/>
                 </p:oleObj>
               </mc:Choice>
@@ -12949,7 +13213,7 @@
           <p:nvPr>
             <p:extLst>
               <p:ext uri="{D42A27DB-BD31-4B8C-83A1-F6EECF244321}">
-                <p14:modId xmlns:p14="http://schemas.microsoft.com/office/powerpoint/2010/main" val="2865171948"/>
+                <p14:modId xmlns:p14="http://schemas.microsoft.com/office/powerpoint/2010/main" val="3471204959"/>
               </p:ext>
             </p:extLst>
           </p:nvPr>
@@ -12962,7 +13226,7 @@
           <a:graphicData uri="http://schemas.openxmlformats.org/presentationml/2006/ole">
             <mc:AlternateContent xmlns:mc="http://schemas.openxmlformats.org/markup-compatibility/2006">
               <mc:Choice xmlns:v="urn:schemas-microsoft-com:vml" Requires="v">
-                <p:oleObj spid="_x0000_s23574" name="Equation" r:id="rId4" imgW="114300" imgH="165100" progId="Equation.3">
+                <p:oleObj spid="_x0000_s38915" name="Equation" r:id="rId4" imgW="114300" imgH="165100" progId="Equation.3">
                   <p:embed/>
                 </p:oleObj>
               </mc:Choice>
@@ -13006,7 +13270,7 @@
           <p:nvPr>
             <p:extLst>
               <p:ext uri="{D42A27DB-BD31-4B8C-83A1-F6EECF244321}">
-                <p14:modId xmlns:p14="http://schemas.microsoft.com/office/powerpoint/2010/main" val="1964379358"/>
+                <p14:modId xmlns:p14="http://schemas.microsoft.com/office/powerpoint/2010/main" val="1492803058"/>
               </p:ext>
             </p:extLst>
           </p:nvPr>
@@ -13019,7 +13283,7 @@
           <a:graphicData uri="http://schemas.openxmlformats.org/presentationml/2006/ole">
             <mc:AlternateContent xmlns:mc="http://schemas.openxmlformats.org/markup-compatibility/2006">
               <mc:Choice xmlns:v="urn:schemas-microsoft-com:vml" Requires="v">
-                <p:oleObj spid="_x0000_s23575" name="Equation" r:id="rId6" imgW="825500" imgH="457200" progId="Equation.DSMT4">
+                <p:oleObj spid="_x0000_s38916" name="Equation" r:id="rId6" imgW="825500" imgH="457200" progId="Equation.DSMT4">
                   <p:embed/>
                 </p:oleObj>
               </mc:Choice>
@@ -13082,9 +13346,238 @@
           </a:p>
         </p:txBody>
       </p:sp>
+    </p:spTree>
+    <p:extLst>
+      <p:ext uri="{BB962C8B-B14F-4D97-AF65-F5344CB8AC3E}">
+        <p14:creationId xmlns:p14="http://schemas.microsoft.com/office/powerpoint/2010/main" val="1418538923"/>
+      </p:ext>
+    </p:extLst>
+  </p:cSld>
+  <p:clrMapOvr>
+    <a:masterClrMapping/>
+  </p:clrMapOvr>
+  <mc:AlternateContent xmlns:mc="http://schemas.openxmlformats.org/markup-compatibility/2006" xmlns:p14="http://schemas.microsoft.com/office/powerpoint/2010/main">
+    <mc:Choice Requires="p14">
+      <p:transition spd="med" p14:dur="700" advClick="0">
+        <p:fade/>
+      </p:transition>
+    </mc:Choice>
+    <mc:Fallback xmlns="">
+      <p:transition xmlns:p14="http://schemas.microsoft.com/office/powerpoint/2010/main" spd="med" advClick="0">
+        <p:fade/>
+      </p:transition>
+    </mc:Fallback>
+  </mc:AlternateContent>
+  <p:timing>
+    <p:tnLst>
+      <p:par>
+        <p:cTn xmlns:p14="http://schemas.microsoft.com/office/powerpoint/2010/main" id="1" dur="indefinite" restart="never" nodeType="tmRoot"/>
+      </p:par>
+    </p:tnLst>
+  </p:timing>
+</p:sld>
+</file>
+
+<file path=ppt/slides/slide26.xml><?xml version="1.0" encoding="utf-8"?>
+<p:sld xmlns:a="http://schemas.openxmlformats.org/drawingml/2006/main" xmlns:r="http://schemas.openxmlformats.org/officeDocument/2006/relationships" xmlns:p="http://schemas.openxmlformats.org/presentationml/2006/main">
+  <p:cSld>
+    <p:spTree>
+      <p:nvGrpSpPr>
+        <p:cNvPr id="1" name=""/>
+        <p:cNvGrpSpPr/>
+        <p:nvPr/>
+      </p:nvGrpSpPr>
+      <p:grpSpPr>
+        <a:xfrm>
+          <a:off x="0" y="0"/>
+          <a:ext cx="0" cy="0"/>
+          <a:chOff x="0" y="0"/>
+          <a:chExt cx="0" cy="0"/>
+        </a:xfrm>
+      </p:grpSpPr>
       <p:sp>
         <p:nvSpPr>
-          <p:cNvPr id="14" name="TextBox 13"/>
+          <p:cNvPr id="7" name="Slide Number Placeholder 4"/>
+          <p:cNvSpPr>
+            <a:spLocks noGrp="1"/>
+          </p:cNvSpPr>
+          <p:nvPr>
+            <p:ph type="sldNum" sz="quarter" idx="4"/>
+          </p:nvPr>
+        </p:nvSpPr>
+        <p:spPr>
+          <a:xfrm>
+            <a:off x="6477000" y="6553200"/>
+            <a:ext cx="2667000" cy="307777"/>
+          </a:xfrm>
+        </p:spPr>
+        <p:txBody>
+          <a:bodyPr/>
+          <a:lstStyle/>
+          <a:p>
+            <a:pPr>
+              <a:defRPr/>
+            </a:pPr>
+            <a:r>
+              <a:rPr lang="en-US" dirty="0" smtClean="0"/>
+              <a:t>Zn.</a:t>
+            </a:r>
+            <a:fld id="{A808FFD1-D581-4BF4-B068-1D0FA2A32EF2}" type="slidenum">
+              <a:rPr lang="en-US" smtClean="0"/>
+              <a:pPr>
+                <a:defRPr/>
+              </a:pPr>
+              <a:t>26</a:t>
+            </a:fld>
+            <a:endParaRPr lang="en-US" dirty="0"/>
+          </a:p>
+        </p:txBody>
+      </p:sp>
+      <p:graphicFrame>
+        <p:nvGraphicFramePr>
+          <p:cNvPr id="4" name="Object 3"/>
+          <p:cNvGraphicFramePr>
+            <a:graphicFrameLocks noChangeAspect="1"/>
+          </p:cNvGraphicFramePr>
+          <p:nvPr>
+            <p:extLst>
+              <p:ext uri="{D42A27DB-BD31-4B8C-83A1-F6EECF244321}">
+                <p14:modId xmlns:p14="http://schemas.microsoft.com/office/powerpoint/2010/main" val="2865171948"/>
+              </p:ext>
+            </p:extLst>
+          </p:nvPr>
+        </p:nvGraphicFramePr>
+        <p:xfrm>
+          <a:off x="5702300" y="4254500"/>
+          <a:ext cx="114300" cy="165100"/>
+        </p:xfrm>
+        <a:graphic>
+          <a:graphicData uri="http://schemas.openxmlformats.org/presentationml/2006/ole">
+            <mc:AlternateContent xmlns:mc="http://schemas.openxmlformats.org/markup-compatibility/2006">
+              <mc:Choice xmlns:v="urn:schemas-microsoft-com:vml" Requires="v">
+                <p:oleObj spid="_x0000_s23579" name="Equation" r:id="rId4" imgW="114300" imgH="165100" progId="Equation.3">
+                  <p:embed/>
+                </p:oleObj>
+              </mc:Choice>
+              <mc:Fallback>
+                <p:oleObj name="Equation" r:id="rId4" imgW="114300" imgH="165100" progId="Equation.3">
+                  <p:embed/>
+                  <p:pic>
+                    <p:nvPicPr>
+                      <p:cNvPr id="0" name=""/>
+                      <p:cNvPicPr/>
+                      <p:nvPr/>
+                    </p:nvPicPr>
+                    <p:blipFill>
+                      <a:blip r:embed="rId5"/>
+                      <a:stretch>
+                        <a:fillRect/>
+                      </a:stretch>
+                    </p:blipFill>
+                    <p:spPr>
+                      <a:xfrm>
+                        <a:off x="5702300" y="4254500"/>
+                        <a:ext cx="114300" cy="165100"/>
+                      </a:xfrm>
+                      <a:prstGeom prst="rect">
+                        <a:avLst/>
+                      </a:prstGeom>
+                    </p:spPr>
+                  </p:pic>
+                </p:oleObj>
+              </mc:Fallback>
+            </mc:AlternateContent>
+          </a:graphicData>
+        </a:graphic>
+      </p:graphicFrame>
+      <p:graphicFrame>
+        <p:nvGraphicFramePr>
+          <p:cNvPr id="3" name="Object 2"/>
+          <p:cNvGraphicFramePr>
+            <a:graphicFrameLocks noChangeAspect="1"/>
+          </p:cNvGraphicFramePr>
+          <p:nvPr>
+            <p:extLst>
+              <p:ext uri="{D42A27DB-BD31-4B8C-83A1-F6EECF244321}">
+                <p14:modId xmlns:p14="http://schemas.microsoft.com/office/powerpoint/2010/main" val="2312749903"/>
+              </p:ext>
+            </p:extLst>
+          </p:nvPr>
+        </p:nvGraphicFramePr>
+        <p:xfrm>
+          <a:off x="879475" y="1524000"/>
+          <a:ext cx="5095875" cy="1647825"/>
+        </p:xfrm>
+        <a:graphic>
+          <a:graphicData uri="http://schemas.openxmlformats.org/presentationml/2006/ole">
+            <mc:AlternateContent xmlns:mc="http://schemas.openxmlformats.org/markup-compatibility/2006">
+              <mc:Choice xmlns:v="urn:schemas-microsoft-com:vml" Requires="v">
+                <p:oleObj spid="_x0000_s23580" name="Equation" r:id="rId6" imgW="863600" imgH="279400" progId="Equation.3">
+                  <p:embed/>
+                </p:oleObj>
+              </mc:Choice>
+              <mc:Fallback>
+                <p:oleObj name="Equation" r:id="rId6" imgW="863600" imgH="279400" progId="Equation.3">
+                  <p:embed/>
+                  <p:pic>
+                    <p:nvPicPr>
+                      <p:cNvPr id="0" name=""/>
+                      <p:cNvPicPr/>
+                      <p:nvPr/>
+                    </p:nvPicPr>
+                    <p:blipFill>
+                      <a:blip r:embed="rId7"/>
+                      <a:stretch>
+                        <a:fillRect/>
+                      </a:stretch>
+                    </p:blipFill>
+                    <p:spPr>
+                      <a:xfrm>
+                        <a:off x="879475" y="1524000"/>
+                        <a:ext cx="5095875" cy="1647825"/>
+                      </a:xfrm>
+                      <a:prstGeom prst="rect">
+                        <a:avLst/>
+                      </a:prstGeom>
+                    </p:spPr>
+                  </p:pic>
+                </p:oleObj>
+              </mc:Fallback>
+            </mc:AlternateContent>
+          </a:graphicData>
+        </a:graphic>
+      </p:graphicFrame>
+      <p:sp>
+        <p:nvSpPr>
+          <p:cNvPr id="15" name="Rectangle 2"/>
+          <p:cNvSpPr>
+            <a:spLocks noGrp="1" noChangeArrowheads="1"/>
+          </p:cNvSpPr>
+          <p:nvPr>
+            <p:ph type="title"/>
+          </p:nvPr>
+        </p:nvSpPr>
+        <p:spPr>
+          <a:xfrm>
+            <a:off x="1447800" y="0"/>
+            <a:ext cx="7543800" cy="1143000"/>
+          </a:xfrm>
+        </p:spPr>
+        <p:txBody>
+          <a:bodyPr/>
+          <a:lstStyle/>
+          <a:p>
+            <a:pPr eaLnBrk="1" hangingPunct="1"/>
+            <a:r>
+              <a:rPr lang="en-US" sz="4800" dirty="0" smtClean="0"/>
+              <a:t>Proof of Euler</a:t>
+            </a:r>
+          </a:p>
+        </p:txBody>
+      </p:sp>
+      <p:sp>
+        <p:nvSpPr>
+          <p:cNvPr id="8" name="TextBox 7"/>
           <p:cNvSpPr txBox="1"/>
           <p:nvPr/>
         </p:nvSpPr>
@@ -13169,7 +13662,7 @@
                                           </p:stCondLst>
                                         </p:cTn>
                                         <p:tgtEl>
-                                          <p:spTgt spid="14"/>
+                                          <p:spTgt spid="8"/>
                                         </p:tgtEl>
                                         <p:attrNameLst>
                                           <p:attrName>style.visibility</p:attrName>
@@ -13183,7 +13676,7 @@
                                       <p:cBhvr>
                                         <p:cTn id="7" dur="1000" fill="hold"/>
                                         <p:tgtEl>
-                                          <p:spTgt spid="14"/>
+                                          <p:spTgt spid="8"/>
                                         </p:tgtEl>
                                         <p:attrNameLst>
                                           <p:attrName>ppt_w</p:attrName>
@@ -13206,7 +13699,7 @@
                                       <p:cBhvr>
                                         <p:cTn id="8" dur="1000" fill="hold"/>
                                         <p:tgtEl>
-                                          <p:spTgt spid="14"/>
+                                          <p:spTgt spid="8"/>
                                         </p:tgtEl>
                                         <p:attrNameLst>
                                           <p:attrName>ppt_h</p:attrName>
@@ -13229,7 +13722,7 @@
                                       <p:cBhvr>
                                         <p:cTn id="9" dur="1000" fill="hold"/>
                                         <p:tgtEl>
-                                          <p:spTgt spid="14"/>
+                                          <p:spTgt spid="8"/>
                                         </p:tgtEl>
                                         <p:attrNameLst>
                                           <p:attrName>ppt_x</p:attrName>
@@ -13252,7 +13745,7 @@
                                       <p:cBhvr>
                                         <p:cTn id="10" dur="1000" fill="hold"/>
                                         <p:tgtEl>
-                                          <p:spTgt spid="14"/>
+                                          <p:spTgt spid="8"/>
                                         </p:tgtEl>
                                         <p:attrNameLst>
                                           <p:attrName>ppt_y</p:attrName>
@@ -13302,13 +13795,13 @@
       </p:par>
     </p:tnLst>
     <p:bldLst>
-      <p:bldP spid="14" grpId="0"/>
+      <p:bldP spid="8" grpId="0"/>
     </p:bldLst>
   </p:timing>
 </p:sld>
 </file>
 
-<file path=ppt/slides/slide26.xml><?xml version="1.0" encoding="utf-8"?>
+<file path=ppt/slides/slide27.xml><?xml version="1.0" encoding="utf-8"?>
 <p:sld xmlns:a="http://schemas.openxmlformats.org/drawingml/2006/main" xmlns:r="http://schemas.openxmlformats.org/officeDocument/2006/relationships" xmlns:p="http://schemas.openxmlformats.org/presentationml/2006/main" show="0">
   <p:cSld>
     <p:spTree>
@@ -13357,7 +13850,7 @@
               <a:pPr>
                 <a:defRPr/>
               </a:pPr>
-              <a:t>26</a:t>
+              <a:t>27</a:t>
             </a:fld>
             <a:endParaRPr lang="en-US" dirty="0"/>
           </a:p>
@@ -13408,7 +13901,7 @@
           <a:graphicData uri="http://schemas.openxmlformats.org/presentationml/2006/ole">
             <mc:AlternateContent xmlns:mc="http://schemas.openxmlformats.org/markup-compatibility/2006">
               <mc:Choice xmlns:v="urn:schemas-microsoft-com:vml" Requires="v">
-                <p:oleObj spid="_x0000_s22554" name="Equation" r:id="rId4" imgW="114300" imgH="165100" progId="Equation.3">
+                <p:oleObj spid="_x0000_s22563" name="Equation" r:id="rId4" imgW="114300" imgH="165100" progId="Equation.3">
                   <p:embed/>
                 </p:oleObj>
               </mc:Choice>
@@ -13465,7 +13958,7 @@
           <a:graphicData uri="http://schemas.openxmlformats.org/presentationml/2006/ole">
             <mc:AlternateContent xmlns:mc="http://schemas.openxmlformats.org/markup-compatibility/2006">
               <mc:Choice xmlns:v="urn:schemas-microsoft-com:vml" Requires="v">
-                <p:oleObj spid="_x0000_s22555" name="Equation" r:id="rId6" imgW="762000" imgH="292100" progId="Equation.DSMT4">
+                <p:oleObj spid="_x0000_s22564" name="Equation" r:id="rId6" imgW="762000" imgH="292100" progId="Equation.DSMT4">
                   <p:embed/>
                 </p:oleObj>
               </mc:Choice>
@@ -13522,7 +14015,7 @@
           <a:graphicData uri="http://schemas.openxmlformats.org/presentationml/2006/ole">
             <mc:AlternateContent xmlns:mc="http://schemas.openxmlformats.org/markup-compatibility/2006">
               <mc:Choice xmlns:v="urn:schemas-microsoft-com:vml" Requires="v">
-                <p:oleObj spid="_x0000_s22556" name="Equation" r:id="rId8" imgW="1790700" imgH="584200" progId="Equation.DSMT4">
+                <p:oleObj spid="_x0000_s22565" name="Equation" r:id="rId8" imgW="1790700" imgH="584200" progId="Equation.DSMT4">
                   <p:embed/>
                 </p:oleObj>
               </mc:Choice>
@@ -13579,7 +14072,7 @@
           <a:graphicData uri="http://schemas.openxmlformats.org/presentationml/2006/ole">
             <mc:AlternateContent xmlns:mc="http://schemas.openxmlformats.org/markup-compatibility/2006">
               <mc:Choice xmlns:v="urn:schemas-microsoft-com:vml" Requires="v">
-                <p:oleObj spid="_x0000_s22557" name="Equation" r:id="rId10" imgW="1485900" imgH="330200" progId="Equation.DSMT4">
+                <p:oleObj spid="_x0000_s22566" name="Equation" r:id="rId10" imgW="1485900" imgH="330200" progId="Equation.DSMT4">
                   <p:embed/>
                 </p:oleObj>
               </mc:Choice>
@@ -13646,7 +14139,7 @@
 </p:sld>
 </file>
 
-<file path=ppt/slides/slide27.xml><?xml version="1.0" encoding="utf-8"?>
+<file path=ppt/slides/slide28.xml><?xml version="1.0" encoding="utf-8"?>
 <p:sld xmlns:a="http://schemas.openxmlformats.org/drawingml/2006/main" xmlns:r="http://schemas.openxmlformats.org/officeDocument/2006/relationships" xmlns:p="http://schemas.openxmlformats.org/presentationml/2006/main" show="0">
   <p:cSld>
     <p:spTree>
@@ -13695,7 +14188,7 @@
               <a:pPr>
                 <a:defRPr/>
               </a:pPr>
-              <a:t>27</a:t>
+              <a:t>28</a:t>
             </a:fld>
             <a:endParaRPr lang="en-US" dirty="0"/>
           </a:p>
@@ -13740,7 +14233,7 @@
           <a:graphicData uri="http://schemas.openxmlformats.org/presentationml/2006/ole">
             <mc:AlternateContent xmlns:mc="http://schemas.openxmlformats.org/markup-compatibility/2006">
               <mc:Choice xmlns:v="urn:schemas-microsoft-com:vml" Requires="v">
-                <p:oleObj spid="_x0000_s1050" name="Equation" r:id="rId4" imgW="126720" imgH="190440" progId="Equation.DSMT4">
+                <p:oleObj spid="_x0000_s1055" name="Equation" r:id="rId4" imgW="126720" imgH="190440" progId="Equation.DSMT4">
                   <p:embed/>
                 </p:oleObj>
               </mc:Choice>
@@ -13841,7 +14334,7 @@
           <a:graphicData uri="http://schemas.openxmlformats.org/presentationml/2006/ole">
             <mc:AlternateContent xmlns:mc="http://schemas.openxmlformats.org/markup-compatibility/2006">
               <mc:Choice xmlns:v="urn:schemas-microsoft-com:vml" Requires="v">
-                <p:oleObj spid="_x0000_s1051" name="Equation" r:id="rId6" imgW="2044700" imgH="647700" progId="Equation.3">
+                <p:oleObj spid="_x0000_s1056" name="Equation" r:id="rId6" imgW="2044700" imgH="647700" progId="Equation.3">
                   <p:embed/>
                 </p:oleObj>
               </mc:Choice>
@@ -14006,7 +14499,7 @@
 </p:sld>
 </file>
 
-<file path=ppt/slides/slide28.xml><?xml version="1.0" encoding="utf-8"?>
+<file path=ppt/slides/slide29.xml><?xml version="1.0" encoding="utf-8"?>
 <p:sld xmlns:a="http://schemas.openxmlformats.org/drawingml/2006/main" xmlns:r="http://schemas.openxmlformats.org/officeDocument/2006/relationships" xmlns:p="http://schemas.openxmlformats.org/presentationml/2006/main" show="0">
   <p:cSld>
     <p:spTree>
@@ -14055,7 +14548,7 @@
               <a:pPr>
                 <a:defRPr/>
               </a:pPr>
-              <a:t>28</a:t>
+              <a:t>29</a:t>
             </a:fld>
             <a:endParaRPr lang="en-US" dirty="0"/>
           </a:p>
@@ -14100,7 +14593,7 @@
           <a:graphicData uri="http://schemas.openxmlformats.org/presentationml/2006/ole">
             <mc:AlternateContent xmlns:mc="http://schemas.openxmlformats.org/markup-compatibility/2006">
               <mc:Choice xmlns:v="urn:schemas-microsoft-com:vml" Requires="v">
-                <p:oleObj spid="_x0000_s2074" name="Equation" r:id="rId4" imgW="126720" imgH="190440" progId="Equation.DSMT4">
+                <p:oleObj spid="_x0000_s2079" name="Equation" r:id="rId4" imgW="126720" imgH="190440" progId="Equation.DSMT4">
                   <p:embed/>
                 </p:oleObj>
               </mc:Choice>
@@ -14170,7 +14663,7 @@
           <a:graphicData uri="http://schemas.openxmlformats.org/presentationml/2006/ole">
             <mc:AlternateContent xmlns:mc="http://schemas.openxmlformats.org/markup-compatibility/2006">
               <mc:Choice xmlns:v="urn:schemas-microsoft-com:vml" Requires="v">
-                <p:oleObj spid="_x0000_s2075" name="Equation" r:id="rId6" imgW="2044700" imgH="812800" progId="Equation.3">
+                <p:oleObj spid="_x0000_s2080" name="Equation" r:id="rId6" imgW="2044700" imgH="812800" progId="Equation.3">
                   <p:embed/>
                 </p:oleObj>
               </mc:Choice>
@@ -14249,7 +14742,208 @@
 </p:sld>
 </file>
 
-<file path=ppt/slides/slide29.xml><?xml version="1.0" encoding="utf-8"?>
+<file path=ppt/slides/slide3.xml><?xml version="1.0" encoding="utf-8"?>
+<p:sld xmlns:a="http://schemas.openxmlformats.org/drawingml/2006/main" xmlns:r="http://schemas.openxmlformats.org/officeDocument/2006/relationships" xmlns:p="http://schemas.openxmlformats.org/presentationml/2006/main" show="0">
+  <p:cSld>
+    <p:spTree>
+      <p:nvGrpSpPr>
+        <p:cNvPr id="1" name=""/>
+        <p:cNvGrpSpPr/>
+        <p:nvPr/>
+      </p:nvGrpSpPr>
+      <p:grpSpPr>
+        <a:xfrm>
+          <a:off x="0" y="0"/>
+          <a:ext cx="0" cy="0"/>
+          <a:chOff x="0" y="0"/>
+          <a:chExt cx="0" cy="0"/>
+        </a:xfrm>
+      </p:grpSpPr>
+      <p:sp>
+        <p:nvSpPr>
+          <p:cNvPr id="7" name="Slide Number Placeholder 4"/>
+          <p:cNvSpPr>
+            <a:spLocks noGrp="1"/>
+          </p:cNvSpPr>
+          <p:nvPr>
+            <p:ph type="sldNum" sz="quarter" idx="4"/>
+          </p:nvPr>
+        </p:nvSpPr>
+        <p:spPr>
+          <a:xfrm>
+            <a:off x="6477000" y="6553200"/>
+            <a:ext cx="2667000" cy="307777"/>
+          </a:xfrm>
+        </p:spPr>
+        <p:txBody>
+          <a:bodyPr/>
+          <a:lstStyle/>
+          <a:p>
+            <a:pPr>
+              <a:defRPr/>
+            </a:pPr>
+            <a:r>
+              <a:rPr lang="en-US" dirty="0" smtClean="0"/>
+              <a:t>Zn.</a:t>
+            </a:r>
+            <a:fld id="{A808FFD1-D581-4BF4-B068-1D0FA2A32EF2}" type="slidenum">
+              <a:rPr lang="en-US" smtClean="0"/>
+              <a:pPr>
+                <a:defRPr/>
+              </a:pPr>
+              <a:t>3</a:t>
+            </a:fld>
+            <a:endParaRPr lang="en-US" dirty="0"/>
+          </a:p>
+        </p:txBody>
+      </p:sp>
+      <p:graphicFrame>
+        <p:nvGraphicFramePr>
+          <p:cNvPr id="5" name="Object 4"/>
+          <p:cNvGraphicFramePr>
+            <a:graphicFrameLocks noChangeAspect="1"/>
+          </p:cNvGraphicFramePr>
+          <p:nvPr>
+            <p:extLst>
+              <p:ext uri="{D42A27DB-BD31-4B8C-83A1-F6EECF244321}">
+                <p14:modId xmlns:p14="http://schemas.microsoft.com/office/powerpoint/2010/main" val="3104848849"/>
+              </p:ext>
+            </p:extLst>
+          </p:nvPr>
+        </p:nvGraphicFramePr>
+        <p:xfrm>
+          <a:off x="1574799" y="0"/>
+          <a:ext cx="6328953" cy="1447800"/>
+        </p:xfrm>
+        <a:graphic>
+          <a:graphicData uri="http://schemas.openxmlformats.org/presentationml/2006/ole">
+            <mc:AlternateContent xmlns:mc="http://schemas.openxmlformats.org/markup-compatibility/2006">
+              <mc:Choice xmlns:v="urn:schemas-microsoft-com:vml" Requires="v">
+                <p:oleObj spid="_x0000_s7198" name="Equation" r:id="rId4" imgW="1447800" imgH="292100" progId="Equation.DSMT4">
+                  <p:embed/>
+                </p:oleObj>
+              </mc:Choice>
+              <mc:Fallback>
+                <p:oleObj name="Equation" r:id="rId4" imgW="1447800" imgH="292100" progId="Equation.DSMT4">
+                  <p:embed/>
+                  <p:pic>
+                    <p:nvPicPr>
+                      <p:cNvPr id="0" name=""/>
+                      <p:cNvPicPr/>
+                      <p:nvPr/>
+                    </p:nvPicPr>
+                    <p:blipFill>
+                      <a:blip r:embed="rId5"/>
+                      <a:stretch>
+                        <a:fillRect/>
+                      </a:stretch>
+                    </p:blipFill>
+                    <p:spPr>
+                      <a:xfrm>
+                        <a:off x="1574799" y="0"/>
+                        <a:ext cx="6328953" cy="1447800"/>
+                      </a:xfrm>
+                      <a:prstGeom prst="rect">
+                        <a:avLst/>
+                      </a:prstGeom>
+                    </p:spPr>
+                  </p:pic>
+                </p:oleObj>
+              </mc:Fallback>
+            </mc:AlternateContent>
+          </a:graphicData>
+        </a:graphic>
+      </p:graphicFrame>
+      <p:graphicFrame>
+        <p:nvGraphicFramePr>
+          <p:cNvPr id="12" name="Object 11"/>
+          <p:cNvGraphicFramePr>
+            <a:graphicFrameLocks noChangeAspect="1"/>
+          </p:cNvGraphicFramePr>
+          <p:nvPr>
+            <p:extLst>
+              <p:ext uri="{D42A27DB-BD31-4B8C-83A1-F6EECF244321}">
+                <p14:modId xmlns:p14="http://schemas.microsoft.com/office/powerpoint/2010/main" val="855154793"/>
+              </p:ext>
+            </p:extLst>
+          </p:nvPr>
+        </p:nvGraphicFramePr>
+        <p:xfrm>
+          <a:off x="561109" y="1600200"/>
+          <a:ext cx="8021782" cy="1828800"/>
+        </p:xfrm>
+        <a:graphic>
+          <a:graphicData uri="http://schemas.openxmlformats.org/presentationml/2006/ole">
+            <mc:AlternateContent xmlns:mc="http://schemas.openxmlformats.org/markup-compatibility/2006">
+              <mc:Choice xmlns:v="urn:schemas-microsoft-com:vml" Requires="v">
+                <p:oleObj spid="_x0000_s7199" name="Equation" r:id="rId6" imgW="2451100" imgH="558800" progId="Equation.DSMT4">
+                  <p:embed/>
+                </p:oleObj>
+              </mc:Choice>
+              <mc:Fallback>
+                <p:oleObj name="Equation" r:id="rId6" imgW="2451100" imgH="558800" progId="Equation.DSMT4">
+                  <p:embed/>
+                  <p:pic>
+                    <p:nvPicPr>
+                      <p:cNvPr id="0" name=""/>
+                      <p:cNvPicPr/>
+                      <p:nvPr/>
+                    </p:nvPicPr>
+                    <p:blipFill>
+                      <a:blip r:embed="rId7"/>
+                      <a:stretch>
+                        <a:fillRect/>
+                      </a:stretch>
+                    </p:blipFill>
+                    <p:spPr>
+                      <a:xfrm>
+                        <a:off x="561109" y="1600200"/>
+                        <a:ext cx="8021782" cy="1828800"/>
+                      </a:xfrm>
+                      <a:prstGeom prst="rect">
+                        <a:avLst/>
+                      </a:prstGeom>
+                    </p:spPr>
+                  </p:pic>
+                </p:oleObj>
+              </mc:Fallback>
+            </mc:AlternateContent>
+          </a:graphicData>
+        </a:graphic>
+      </p:graphicFrame>
+    </p:spTree>
+    <p:extLst>
+      <p:ext uri="{BB962C8B-B14F-4D97-AF65-F5344CB8AC3E}">
+        <p14:creationId xmlns:p14="http://schemas.microsoft.com/office/powerpoint/2010/main" val="1721424634"/>
+      </p:ext>
+    </p:extLst>
+  </p:cSld>
+  <p:clrMapOvr>
+    <a:masterClrMapping/>
+  </p:clrMapOvr>
+  <mc:AlternateContent xmlns:mc="http://schemas.openxmlformats.org/markup-compatibility/2006">
+    <mc:Choice xmlns:p14="http://schemas.microsoft.com/office/powerpoint/2010/main" Requires="p14">
+      <p:transition spd="med" p14:dur="700" advClick="0">
+        <p:fade/>
+      </p:transition>
+    </mc:Choice>
+    <mc:Fallback>
+      <p:transition xmlns:p14="http://schemas.microsoft.com/office/powerpoint/2010/main" spd="med" advClick="0">
+        <p:fade/>
+      </p:transition>
+    </mc:Fallback>
+  </mc:AlternateContent>
+  <p:timing>
+    <p:tnLst>
+      <p:par>
+        <p:cTn xmlns:p14="http://schemas.microsoft.com/office/powerpoint/2010/main" id="1" dur="indefinite" restart="never" nodeType="tmRoot"/>
+      </p:par>
+    </p:tnLst>
+  </p:timing>
+</p:sld>
+</file>
+
+<file path=ppt/slides/slide30.xml><?xml version="1.0" encoding="utf-8"?>
 <p:sld xmlns:a="http://schemas.openxmlformats.org/drawingml/2006/main" xmlns:r="http://schemas.openxmlformats.org/officeDocument/2006/relationships" xmlns:p="http://schemas.openxmlformats.org/presentationml/2006/main" show="0">
   <p:cSld>
     <p:spTree>
@@ -14282,7 +14976,7 @@
           <a:graphicData uri="http://schemas.openxmlformats.org/presentationml/2006/ole">
             <mc:AlternateContent xmlns:mc="http://schemas.openxmlformats.org/markup-compatibility/2006">
               <mc:Choice xmlns:v="urn:schemas-microsoft-com:vml" Requires="v">
-                <p:oleObj spid="_x0000_s3098" name="Equation" r:id="rId4" imgW="2031840" imgH="736560" progId="Equation.DSMT4">
+                <p:oleObj spid="_x0000_s3103" name="Equation" r:id="rId4" imgW="2031840" imgH="736560" progId="Equation.DSMT4">
                   <p:embed/>
                 </p:oleObj>
               </mc:Choice>
@@ -14361,7 +15055,7 @@
               <a:pPr>
                 <a:defRPr/>
               </a:pPr>
-              <a:t>29</a:t>
+              <a:t>30</a:t>
             </a:fld>
             <a:endParaRPr lang="en-US" dirty="0"/>
           </a:p>
@@ -14406,7 +15100,7 @@
           <a:graphicData uri="http://schemas.openxmlformats.org/presentationml/2006/ole">
             <mc:AlternateContent xmlns:mc="http://schemas.openxmlformats.org/markup-compatibility/2006">
               <mc:Choice xmlns:v="urn:schemas-microsoft-com:vml" Requires="v">
-                <p:oleObj spid="_x0000_s3099" name="Equation" r:id="rId6" imgW="126720" imgH="190440" progId="Equation.3">
+                <p:oleObj spid="_x0000_s3104" name="Equation" r:id="rId6" imgW="126720" imgH="190440" progId="Equation.3">
                   <p:embed/>
                 </p:oleObj>
               </mc:Choice>
@@ -14492,208 +15186,7 @@
 </p:sld>
 </file>
 
-<file path=ppt/slides/slide3.xml><?xml version="1.0" encoding="utf-8"?>
-<p:sld xmlns:a="http://schemas.openxmlformats.org/drawingml/2006/main" xmlns:r="http://schemas.openxmlformats.org/officeDocument/2006/relationships" xmlns:p="http://schemas.openxmlformats.org/presentationml/2006/main" show="0">
-  <p:cSld>
-    <p:spTree>
-      <p:nvGrpSpPr>
-        <p:cNvPr id="1" name=""/>
-        <p:cNvGrpSpPr/>
-        <p:nvPr/>
-      </p:nvGrpSpPr>
-      <p:grpSpPr>
-        <a:xfrm>
-          <a:off x="0" y="0"/>
-          <a:ext cx="0" cy="0"/>
-          <a:chOff x="0" y="0"/>
-          <a:chExt cx="0" cy="0"/>
-        </a:xfrm>
-      </p:grpSpPr>
-      <p:sp>
-        <p:nvSpPr>
-          <p:cNvPr id="7" name="Slide Number Placeholder 4"/>
-          <p:cNvSpPr>
-            <a:spLocks noGrp="1"/>
-          </p:cNvSpPr>
-          <p:nvPr>
-            <p:ph type="sldNum" sz="quarter" idx="4"/>
-          </p:nvPr>
-        </p:nvSpPr>
-        <p:spPr>
-          <a:xfrm>
-            <a:off x="6477000" y="6553200"/>
-            <a:ext cx="2667000" cy="307777"/>
-          </a:xfrm>
-        </p:spPr>
-        <p:txBody>
-          <a:bodyPr/>
-          <a:lstStyle/>
-          <a:p>
-            <a:pPr>
-              <a:defRPr/>
-            </a:pPr>
-            <a:r>
-              <a:rPr lang="en-US" dirty="0" smtClean="0"/>
-              <a:t>Zn.</a:t>
-            </a:r>
-            <a:fld id="{A808FFD1-D581-4BF4-B068-1D0FA2A32EF2}" type="slidenum">
-              <a:rPr lang="en-US" smtClean="0"/>
-              <a:pPr>
-                <a:defRPr/>
-              </a:pPr>
-              <a:t>3</a:t>
-            </a:fld>
-            <a:endParaRPr lang="en-US" dirty="0"/>
-          </a:p>
-        </p:txBody>
-      </p:sp>
-      <p:graphicFrame>
-        <p:nvGraphicFramePr>
-          <p:cNvPr id="5" name="Object 4"/>
-          <p:cNvGraphicFramePr>
-            <a:graphicFrameLocks noChangeAspect="1"/>
-          </p:cNvGraphicFramePr>
-          <p:nvPr>
-            <p:extLst>
-              <p:ext uri="{D42A27DB-BD31-4B8C-83A1-F6EECF244321}">
-                <p14:modId xmlns:p14="http://schemas.microsoft.com/office/powerpoint/2010/main" val="3104848849"/>
-              </p:ext>
-            </p:extLst>
-          </p:nvPr>
-        </p:nvGraphicFramePr>
-        <p:xfrm>
-          <a:off x="1574799" y="0"/>
-          <a:ext cx="6328953" cy="1447800"/>
-        </p:xfrm>
-        <a:graphic>
-          <a:graphicData uri="http://schemas.openxmlformats.org/presentationml/2006/ole">
-            <mc:AlternateContent xmlns:mc="http://schemas.openxmlformats.org/markup-compatibility/2006">
-              <mc:Choice xmlns:v="urn:schemas-microsoft-com:vml" Requires="v">
-                <p:oleObj spid="_x0000_s7193" name="Equation" r:id="rId4" imgW="1447800" imgH="292100" progId="Equation.DSMT4">
-                  <p:embed/>
-                </p:oleObj>
-              </mc:Choice>
-              <mc:Fallback>
-                <p:oleObj name="Equation" r:id="rId4" imgW="1447800" imgH="292100" progId="Equation.DSMT4">
-                  <p:embed/>
-                  <p:pic>
-                    <p:nvPicPr>
-                      <p:cNvPr id="0" name=""/>
-                      <p:cNvPicPr/>
-                      <p:nvPr/>
-                    </p:nvPicPr>
-                    <p:blipFill>
-                      <a:blip r:embed="rId5"/>
-                      <a:stretch>
-                        <a:fillRect/>
-                      </a:stretch>
-                    </p:blipFill>
-                    <p:spPr>
-                      <a:xfrm>
-                        <a:off x="1574799" y="0"/>
-                        <a:ext cx="6328953" cy="1447800"/>
-                      </a:xfrm>
-                      <a:prstGeom prst="rect">
-                        <a:avLst/>
-                      </a:prstGeom>
-                    </p:spPr>
-                  </p:pic>
-                </p:oleObj>
-              </mc:Fallback>
-            </mc:AlternateContent>
-          </a:graphicData>
-        </a:graphic>
-      </p:graphicFrame>
-      <p:graphicFrame>
-        <p:nvGraphicFramePr>
-          <p:cNvPr id="12" name="Object 11"/>
-          <p:cNvGraphicFramePr>
-            <a:graphicFrameLocks noChangeAspect="1"/>
-          </p:cNvGraphicFramePr>
-          <p:nvPr>
-            <p:extLst>
-              <p:ext uri="{D42A27DB-BD31-4B8C-83A1-F6EECF244321}">
-                <p14:modId xmlns:p14="http://schemas.microsoft.com/office/powerpoint/2010/main" val="855154793"/>
-              </p:ext>
-            </p:extLst>
-          </p:nvPr>
-        </p:nvGraphicFramePr>
-        <p:xfrm>
-          <a:off x="561109" y="1600200"/>
-          <a:ext cx="8021782" cy="1828800"/>
-        </p:xfrm>
-        <a:graphic>
-          <a:graphicData uri="http://schemas.openxmlformats.org/presentationml/2006/ole">
-            <mc:AlternateContent xmlns:mc="http://schemas.openxmlformats.org/markup-compatibility/2006">
-              <mc:Choice xmlns:v="urn:schemas-microsoft-com:vml" Requires="v">
-                <p:oleObj spid="_x0000_s7194" name="Equation" r:id="rId6" imgW="2451100" imgH="558800" progId="Equation.DSMT4">
-                  <p:embed/>
-                </p:oleObj>
-              </mc:Choice>
-              <mc:Fallback>
-                <p:oleObj name="Equation" r:id="rId6" imgW="2451100" imgH="558800" progId="Equation.DSMT4">
-                  <p:embed/>
-                  <p:pic>
-                    <p:nvPicPr>
-                      <p:cNvPr id="0" name=""/>
-                      <p:cNvPicPr/>
-                      <p:nvPr/>
-                    </p:nvPicPr>
-                    <p:blipFill>
-                      <a:blip r:embed="rId7"/>
-                      <a:stretch>
-                        <a:fillRect/>
-                      </a:stretch>
-                    </p:blipFill>
-                    <p:spPr>
-                      <a:xfrm>
-                        <a:off x="561109" y="1600200"/>
-                        <a:ext cx="8021782" cy="1828800"/>
-                      </a:xfrm>
-                      <a:prstGeom prst="rect">
-                        <a:avLst/>
-                      </a:prstGeom>
-                    </p:spPr>
-                  </p:pic>
-                </p:oleObj>
-              </mc:Fallback>
-            </mc:AlternateContent>
-          </a:graphicData>
-        </a:graphic>
-      </p:graphicFrame>
-    </p:spTree>
-    <p:extLst>
-      <p:ext uri="{BB962C8B-B14F-4D97-AF65-F5344CB8AC3E}">
-        <p14:creationId xmlns:p14="http://schemas.microsoft.com/office/powerpoint/2010/main" val="1721424634"/>
-      </p:ext>
-    </p:extLst>
-  </p:cSld>
-  <p:clrMapOvr>
-    <a:masterClrMapping/>
-  </p:clrMapOvr>
-  <mc:AlternateContent xmlns:mc="http://schemas.openxmlformats.org/markup-compatibility/2006">
-    <mc:Choice xmlns:p14="http://schemas.microsoft.com/office/powerpoint/2010/main" Requires="p14">
-      <p:transition spd="med" p14:dur="700" advClick="0">
-        <p:fade/>
-      </p:transition>
-    </mc:Choice>
-    <mc:Fallback>
-      <p:transition xmlns:p14="http://schemas.microsoft.com/office/powerpoint/2010/main" spd="med" advClick="0">
-        <p:fade/>
-      </p:transition>
-    </mc:Fallback>
-  </mc:AlternateContent>
-  <p:timing>
-    <p:tnLst>
-      <p:par>
-        <p:cTn xmlns:p14="http://schemas.microsoft.com/office/powerpoint/2010/main" id="1" dur="indefinite" restart="never" nodeType="tmRoot"/>
-      </p:par>
-    </p:tnLst>
-  </p:timing>
-</p:sld>
-</file>
-
-<file path=ppt/slides/slide30.xml><?xml version="1.0" encoding="utf-8"?>
+<file path=ppt/slides/slide31.xml><?xml version="1.0" encoding="utf-8"?>
 <p:sld xmlns:a="http://schemas.openxmlformats.org/drawingml/2006/main" xmlns:r="http://schemas.openxmlformats.org/officeDocument/2006/relationships" xmlns:p="http://schemas.openxmlformats.org/presentationml/2006/main" show="0">
   <p:cSld>
     <p:spTree>
@@ -14742,7 +15235,7 @@
               <a:pPr>
                 <a:defRPr/>
               </a:pPr>
-              <a:t>30</a:t>
+              <a:t>31</a:t>
             </a:fld>
             <a:endParaRPr lang="en-US" dirty="0"/>
           </a:p>
@@ -15034,7 +15527,7 @@
           <a:graphicData uri="http://schemas.openxmlformats.org/presentationml/2006/ole">
             <mc:AlternateContent xmlns:mc="http://schemas.openxmlformats.org/markup-compatibility/2006">
               <mc:Choice xmlns:v="urn:schemas-microsoft-com:vml" Requires="v">
-                <p:oleObj spid="_x0000_s4132" name="Equation" r:id="rId4" imgW="126720" imgH="190440" progId="Equation.DSMT4">
+                <p:oleObj spid="_x0000_s4139" name="Equation" r:id="rId4" imgW="126720" imgH="190440" progId="Equation.DSMT4">
                   <p:embed/>
                 </p:oleObj>
               </mc:Choice>
@@ -15104,7 +15597,7 @@
           <a:graphicData uri="http://schemas.openxmlformats.org/presentationml/2006/ole">
             <mc:AlternateContent xmlns:mc="http://schemas.openxmlformats.org/markup-compatibility/2006">
               <mc:Choice xmlns:v="urn:schemas-microsoft-com:vml" Requires="v">
-                <p:oleObj spid="_x0000_s4133" name="Equation" r:id="rId6" imgW="393480" imgH="342720" progId="Equation.DSMT4">
+                <p:oleObj spid="_x0000_s4140" name="Equation" r:id="rId6" imgW="393480" imgH="342720" progId="Equation.DSMT4">
                   <p:embed/>
                 </p:oleObj>
               </mc:Choice>
@@ -15174,7 +15667,7 @@
           <a:graphicData uri="http://schemas.openxmlformats.org/presentationml/2006/ole">
             <mc:AlternateContent xmlns:mc="http://schemas.openxmlformats.org/markup-compatibility/2006">
               <mc:Choice xmlns:v="urn:schemas-microsoft-com:vml" Requires="v">
-                <p:oleObj spid="_x0000_s4134" name="Equation" r:id="rId8" imgW="1917360" imgH="711000" progId="Equation.3">
+                <p:oleObj spid="_x0000_s4141" name="Equation" r:id="rId8" imgW="1917360" imgH="711000" progId="Equation.3">
                   <p:embed/>
                 </p:oleObj>
               </mc:Choice>
@@ -15781,7 +16274,7 @@
           <a:graphicData uri="http://schemas.openxmlformats.org/presentationml/2006/ole">
             <mc:AlternateContent xmlns:mc="http://schemas.openxmlformats.org/markup-compatibility/2006">
               <mc:Choice xmlns:v="urn:schemas-microsoft-com:vml" Requires="v">
-                <p:oleObj spid="_x0000_s9240" name="Equation" r:id="rId4" imgW="990600" imgH="292100" progId="Equation.DSMT4">
+                <p:oleObj spid="_x0000_s9247" name="Equation" r:id="rId4" imgW="990600" imgH="292100" progId="Equation.DSMT4">
                   <p:embed/>
                 </p:oleObj>
               </mc:Choice>
@@ -15838,7 +16331,7 @@
           <a:graphicData uri="http://schemas.openxmlformats.org/presentationml/2006/ole">
             <mc:AlternateContent xmlns:mc="http://schemas.openxmlformats.org/markup-compatibility/2006">
               <mc:Choice xmlns:v="urn:schemas-microsoft-com:vml" Requires="v">
-                <p:oleObj spid="_x0000_s9241" name="Equation" r:id="rId6" imgW="1130300" imgH="292100" progId="Equation.DSMT4">
+                <p:oleObj spid="_x0000_s9248" name="Equation" r:id="rId6" imgW="1130300" imgH="292100" progId="Equation.DSMT4">
                   <p:embed/>
                 </p:oleObj>
               </mc:Choice>
@@ -15895,7 +16388,7 @@
           <a:graphicData uri="http://schemas.openxmlformats.org/presentationml/2006/ole">
             <mc:AlternateContent xmlns:mc="http://schemas.openxmlformats.org/markup-compatibility/2006">
               <mc:Choice xmlns:v="urn:schemas-microsoft-com:vml" Requires="v">
-                <p:oleObj spid="_x0000_s9242" name="Equation" r:id="rId8" imgW="1130300" imgH="292100" progId="Equation.DSMT4">
+                <p:oleObj spid="_x0000_s9249" name="Equation" r:id="rId8" imgW="1130300" imgH="292100" progId="Equation.DSMT4">
                   <p:embed/>
                 </p:oleObj>
               </mc:Choice>
@@ -16247,7 +16740,7 @@
           <a:graphicData uri="http://schemas.openxmlformats.org/presentationml/2006/ole">
             <mc:AlternateContent xmlns:mc="http://schemas.openxmlformats.org/markup-compatibility/2006">
               <mc:Choice xmlns:v="urn:schemas-microsoft-com:vml" Requires="v">
-                <p:oleObj spid="_x0000_s12303" name="Equation" r:id="rId4" imgW="1701800" imgH="558800" progId="Equation.DSMT4">
+                <p:oleObj spid="_x0000_s12308" name="Equation" r:id="rId4" imgW="1701800" imgH="558800" progId="Equation.DSMT4">
                   <p:embed/>
                 </p:oleObj>
               </mc:Choice>
@@ -16304,7 +16797,7 @@
           <a:graphicData uri="http://schemas.openxmlformats.org/presentationml/2006/ole">
             <mc:AlternateContent xmlns:mc="http://schemas.openxmlformats.org/markup-compatibility/2006">
               <mc:Choice xmlns:v="urn:schemas-microsoft-com:vml" Requires="v">
-                <p:oleObj spid="_x0000_s12304" name="Equation" r:id="rId6" imgW="889000" imgH="292100" progId="Equation.DSMT4">
+                <p:oleObj spid="_x0000_s12309" name="Equation" r:id="rId6" imgW="889000" imgH="292100" progId="Equation.DSMT4">
                   <p:embed/>
                 </p:oleObj>
               </mc:Choice>
@@ -16542,7 +17035,7 @@
           <a:graphicData uri="http://schemas.openxmlformats.org/presentationml/2006/ole">
             <mc:AlternateContent xmlns:mc="http://schemas.openxmlformats.org/markup-compatibility/2006">
               <mc:Choice xmlns:v="urn:schemas-microsoft-com:vml" Requires="v">
-                <p:oleObj spid="_x0000_s10265" name="Equation" r:id="rId4" imgW="1473200" imgH="482600" progId="Equation.DSMT4">
+                <p:oleObj spid="_x0000_s10270" name="Equation" r:id="rId4" imgW="1473200" imgH="482600" progId="Equation.DSMT4">
                   <p:embed/>
                 </p:oleObj>
               </mc:Choice>
@@ -16637,7 +17130,7 @@
           <a:graphicData uri="http://schemas.openxmlformats.org/presentationml/2006/ole">
             <mc:AlternateContent xmlns:mc="http://schemas.openxmlformats.org/markup-compatibility/2006">
               <mc:Choice xmlns:v="urn:schemas-microsoft-com:vml" Requires="v">
-                <p:oleObj spid="_x0000_s10266" name="Equation" r:id="rId6" imgW="1562100" imgH="304800" progId="Equation.3">
+                <p:oleObj spid="_x0000_s10271" name="Equation" r:id="rId6" imgW="1562100" imgH="304800" progId="Equation.3">
                   <p:embed/>
                 </p:oleObj>
               </mc:Choice>
@@ -17049,7 +17542,7 @@
           <a:graphicData uri="http://schemas.openxmlformats.org/presentationml/2006/ole">
             <mc:AlternateContent xmlns:mc="http://schemas.openxmlformats.org/markup-compatibility/2006">
               <mc:Choice xmlns:v="urn:schemas-microsoft-com:vml" Requires="v">
-                <p:oleObj spid="_x0000_s8212" name="Equation" r:id="rId4" imgW="203200" imgH="292100" progId="Equation.DSMT4">
+                <p:oleObj spid="_x0000_s8217" name="Equation" r:id="rId4" imgW="203200" imgH="292100" progId="Equation.DSMT4">
                   <p:embed/>
                 </p:oleObj>
               </mc:Choice>
@@ -17106,7 +17599,7 @@
           <a:graphicData uri="http://schemas.openxmlformats.org/presentationml/2006/ole">
             <mc:AlternateContent xmlns:mc="http://schemas.openxmlformats.org/markup-compatibility/2006">
               <mc:Choice xmlns:v="urn:schemas-microsoft-com:vml" Requires="v">
-                <p:oleObj spid="_x0000_s8213" name="Equation" r:id="rId6" imgW="2616200" imgH="914400" progId="Equation.DSMT4">
+                <p:oleObj spid="_x0000_s8218" name="Equation" r:id="rId6" imgW="2616200" imgH="914400" progId="Equation.DSMT4">
                   <p:embed/>
                 </p:oleObj>
               </mc:Choice>
@@ -17288,7 +17781,7 @@
           <a:graphicData uri="http://schemas.openxmlformats.org/presentationml/2006/ole">
             <mc:AlternateContent xmlns:mc="http://schemas.openxmlformats.org/markup-compatibility/2006">
               <mc:Choice xmlns:v="urn:schemas-microsoft-com:vml" Requires="v">
-                <p:oleObj spid="_x0000_s11287" name="Equation" r:id="rId4" imgW="2336800" imgH="914400" progId="Equation.DSMT4">
+                <p:oleObj spid="_x0000_s11292" name="Equation" r:id="rId4" imgW="2336800" imgH="914400" progId="Equation.DSMT4">
                   <p:embed/>
                 </p:oleObj>
               </mc:Choice>
@@ -17575,7 +18068,7 @@
           <a:graphicData uri="http://schemas.openxmlformats.org/presentationml/2006/ole">
             <mc:AlternateContent xmlns:mc="http://schemas.openxmlformats.org/markup-compatibility/2006">
               <mc:Choice xmlns:v="urn:schemas-microsoft-com:vml" Requires="v">
-                <p:oleObj spid="_x0000_s11288" name="Equation" r:id="rId6" imgW="203200" imgH="292100" progId="Equation.DSMT4">
+                <p:oleObj spid="_x0000_s11293" name="Equation" r:id="rId6" imgW="203200" imgH="292100" progId="Equation.DSMT4">
                   <p:embed/>
                 </p:oleObj>
               </mc:Choice>
@@ -17990,7 +18483,7 @@
           <a:graphicData uri="http://schemas.openxmlformats.org/presentationml/2006/ole">
             <mc:AlternateContent xmlns:mc="http://schemas.openxmlformats.org/markup-compatibility/2006">
               <mc:Choice xmlns:v="urn:schemas-microsoft-com:vml" Requires="v">
-                <p:oleObj spid="_x0000_s13339" name="Equation" r:id="rId4" imgW="203200" imgH="292100" progId="Equation.DSMT4">
+                <p:oleObj spid="_x0000_s13346" name="Equation" r:id="rId4" imgW="203200" imgH="292100" progId="Equation.DSMT4">
                   <p:embed/>
                 </p:oleObj>
               </mc:Choice>
@@ -18047,7 +18540,7 @@
           <a:graphicData uri="http://schemas.openxmlformats.org/presentationml/2006/ole">
             <mc:AlternateContent xmlns:mc="http://schemas.openxmlformats.org/markup-compatibility/2006">
               <mc:Choice xmlns:v="urn:schemas-microsoft-com:vml" Requires="v">
-                <p:oleObj spid="_x0000_s13340" name="Equation" r:id="rId6" imgW="139700" imgH="215900" progId="Equation.DSMT4">
+                <p:oleObj spid="_x0000_s13347" name="Equation" r:id="rId6" imgW="139700" imgH="215900" progId="Equation.DSMT4">
                   <p:embed/>
                 </p:oleObj>
               </mc:Choice>
@@ -18104,7 +18597,7 @@
           <a:graphicData uri="http://schemas.openxmlformats.org/presentationml/2006/ole">
             <mc:AlternateContent xmlns:mc="http://schemas.openxmlformats.org/markup-compatibility/2006">
               <mc:Choice xmlns:v="urn:schemas-microsoft-com:vml" Requires="v">
-                <p:oleObj spid="_x0000_s13341" name="Equation" r:id="rId8" imgW="1257300" imgH="685800" progId="Equation.DSMT4">
+                <p:oleObj spid="_x0000_s13348" name="Equation" r:id="rId8" imgW="1257300" imgH="685800" progId="Equation.DSMT4">
                   <p:embed/>
                 </p:oleObj>
               </mc:Choice>

</xml_diff>

<commit_message>
add soln to PS_binary_gcd; edit connection.pptx, typo Zmodn.pptx
</commit_message>
<xml_diff>
--- a/spring13/slides13/Zmodn.pptx
+++ b/spring13/slides13/Zmodn.pptx
@@ -5361,7 +5361,7 @@
           <a:graphicData uri="http://schemas.openxmlformats.org/presentationml/2006/ole">
             <mc:AlternateContent xmlns:mc="http://schemas.openxmlformats.org/markup-compatibility/2006">
               <mc:Choice xmlns:v="urn:schemas-microsoft-com:vml" Requires="v">
-                <p:oleObj spid="_x0000_s5133" name="Equation" r:id="rId4" imgW="203200" imgH="292100" progId="Equation.DSMT4">
+                <p:oleObj spid="_x0000_s5135" name="Equation" r:id="rId4" imgW="203200" imgH="292100" progId="Equation.DSMT4">
                   <p:embed/>
                 </p:oleObj>
               </mc:Choice>
@@ -5688,7 +5688,7 @@
           <a:graphicData uri="http://schemas.openxmlformats.org/presentationml/2006/ole">
             <mc:AlternateContent xmlns:mc="http://schemas.openxmlformats.org/markup-compatibility/2006">
               <mc:Choice xmlns:v="urn:schemas-microsoft-com:vml" Requires="v">
-                <p:oleObj spid="_x0000_s14377" name="Equation" r:id="rId4" imgW="203200" imgH="292100" progId="Equation.DSMT4">
+                <p:oleObj spid="_x0000_s14382" name="Equation" r:id="rId4" imgW="203200" imgH="292100" progId="Equation.DSMT4">
                   <p:embed/>
                 </p:oleObj>
               </mc:Choice>
@@ -5745,7 +5745,7 @@
           <a:graphicData uri="http://schemas.openxmlformats.org/presentationml/2006/ole">
             <mc:AlternateContent xmlns:mc="http://schemas.openxmlformats.org/markup-compatibility/2006">
               <mc:Choice xmlns:v="urn:schemas-microsoft-com:vml" Requires="v">
-                <p:oleObj spid="_x0000_s14378" name="Equation" r:id="rId6" imgW="139700" imgH="215900" progId="Equation.DSMT4">
+                <p:oleObj spid="_x0000_s14383" name="Equation" r:id="rId6" imgW="139700" imgH="215900" progId="Equation.DSMT4">
                   <p:embed/>
                 </p:oleObj>
               </mc:Choice>
@@ -5789,25 +5789,25 @@
           <p:nvPr>
             <p:extLst>
               <p:ext uri="{D42A27DB-BD31-4B8C-83A1-F6EECF244321}">
-                <p14:modId xmlns:p14="http://schemas.microsoft.com/office/powerpoint/2010/main" val="2328761959"/>
+                <p14:modId xmlns:p14="http://schemas.microsoft.com/office/powerpoint/2010/main" val="569402995"/>
               </p:ext>
             </p:extLst>
           </p:nvPr>
         </p:nvGraphicFramePr>
         <p:xfrm>
-          <a:off x="914400" y="2514600"/>
-          <a:ext cx="7272351" cy="1656080"/>
+          <a:off x="985838" y="2514600"/>
+          <a:ext cx="7127875" cy="1655763"/>
         </p:xfrm>
         <a:graphic>
           <a:graphicData uri="http://schemas.openxmlformats.org/presentationml/2006/ole">
             <mc:AlternateContent xmlns:mc="http://schemas.openxmlformats.org/markup-compatibility/2006">
               <mc:Choice xmlns:v="urn:schemas-microsoft-com:vml" Requires="v">
-                <p:oleObj spid="_x0000_s14379" name="Equation" r:id="rId8" imgW="1282700" imgH="292100" progId="Equation.DSMT4">
+                <p:oleObj spid="_x0000_s14384" name="Equation" r:id="rId8" imgW="1257300" imgH="292100" progId="Equation.DSMT4">
                   <p:embed/>
                 </p:oleObj>
               </mc:Choice>
               <mc:Fallback>
-                <p:oleObj name="Equation" r:id="rId8" imgW="1282700" imgH="292100" progId="Equation.DSMT4">
+                <p:oleObj name="Equation" r:id="rId8" imgW="1257300" imgH="292100" progId="Equation.DSMT4">
                   <p:embed/>
                   <p:pic>
                     <p:nvPicPr>
@@ -5823,8 +5823,8 @@
                     </p:blipFill>
                     <p:spPr>
                       <a:xfrm>
-                        <a:off x="914400" y="2514600"/>
-                        <a:ext cx="7272351" cy="1656080"/>
+                        <a:off x="985838" y="2514600"/>
+                        <a:ext cx="7127875" cy="1655763"/>
                       </a:xfrm>
                       <a:prstGeom prst="rect">
                         <a:avLst/>
@@ -5880,25 +5880,25 @@
           <p:nvPr>
             <p:extLst>
               <p:ext uri="{D42A27DB-BD31-4B8C-83A1-F6EECF244321}">
-                <p14:modId xmlns:p14="http://schemas.microsoft.com/office/powerpoint/2010/main" val="1982828990"/>
+                <p14:modId xmlns:p14="http://schemas.microsoft.com/office/powerpoint/2010/main" val="925860792"/>
               </p:ext>
             </p:extLst>
           </p:nvPr>
         </p:nvGraphicFramePr>
         <p:xfrm>
-          <a:off x="990600" y="3886200"/>
-          <a:ext cx="7097713" cy="1600200"/>
+          <a:off x="955675" y="3886200"/>
+          <a:ext cx="7167563" cy="1600200"/>
         </p:xfrm>
         <a:graphic>
           <a:graphicData uri="http://schemas.openxmlformats.org/presentationml/2006/ole">
             <mc:AlternateContent xmlns:mc="http://schemas.openxmlformats.org/markup-compatibility/2006">
               <mc:Choice xmlns:v="urn:schemas-microsoft-com:vml" Requires="v">
-                <p:oleObj spid="_x0000_s14380" name="Equation" r:id="rId10" imgW="1295400" imgH="292100" progId="Equation.DSMT4">
+                <p:oleObj spid="_x0000_s14385" name="Equation" r:id="rId10" imgW="1308100" imgH="292100" progId="Equation.DSMT4">
                   <p:embed/>
                 </p:oleObj>
               </mc:Choice>
               <mc:Fallback>
-                <p:oleObj name="Equation" r:id="rId10" imgW="1295400" imgH="292100" progId="Equation.DSMT4">
+                <p:oleObj name="Equation" r:id="rId10" imgW="1308100" imgH="292100" progId="Equation.DSMT4">
                   <p:embed/>
                   <p:pic>
                     <p:nvPicPr>
@@ -5914,8 +5914,8 @@
                     </p:blipFill>
                     <p:spPr>
                       <a:xfrm>
-                        <a:off x="990600" y="3886200"/>
-                        <a:ext cx="7097713" cy="1600200"/>
+                        <a:off x="955675" y="3886200"/>
+                        <a:ext cx="7167563" cy="1600200"/>
                       </a:xfrm>
                       <a:prstGeom prst="rect">
                         <a:avLst/>
@@ -6166,7 +6166,7 @@
           <a:graphicData uri="http://schemas.openxmlformats.org/presentationml/2006/ole">
             <mc:AlternateContent xmlns:mc="http://schemas.openxmlformats.org/markup-compatibility/2006">
               <mc:Choice xmlns:v="urn:schemas-microsoft-com:vml" Requires="v">
-                <p:oleObj spid="_x0000_s15390" name="Equation" r:id="rId4" imgW="139700" imgH="215900" progId="Equation.DSMT4">
+                <p:oleObj spid="_x0000_s15394" name="Equation" r:id="rId4" imgW="139700" imgH="215900" progId="Equation.DSMT4">
                   <p:embed/>
                 </p:oleObj>
               </mc:Choice>
@@ -6223,7 +6223,7 @@
           <a:graphicData uri="http://schemas.openxmlformats.org/presentationml/2006/ole">
             <mc:AlternateContent xmlns:mc="http://schemas.openxmlformats.org/markup-compatibility/2006">
               <mc:Choice xmlns:v="urn:schemas-microsoft-com:vml" Requires="v">
-                <p:oleObj spid="_x0000_s15391" name="Equation" r:id="rId6" imgW="1955800" imgH="533400" progId="Equation.DSMT4">
+                <p:oleObj spid="_x0000_s15395" name="Equation" r:id="rId6" imgW="1955800" imgH="533400" progId="Equation.DSMT4">
                   <p:embed/>
                 </p:oleObj>
               </mc:Choice>
@@ -6280,7 +6280,7 @@
           <a:graphicData uri="http://schemas.openxmlformats.org/presentationml/2006/ole">
             <mc:AlternateContent xmlns:mc="http://schemas.openxmlformats.org/markup-compatibility/2006">
               <mc:Choice xmlns:v="urn:schemas-microsoft-com:vml" Requires="v">
-                <p:oleObj spid="_x0000_s15392" name="Equation" r:id="rId8" imgW="1930400" imgH="812800" progId="Equation.DSMT4">
+                <p:oleObj spid="_x0000_s15396" name="Equation" r:id="rId8" imgW="1930400" imgH="812800" progId="Equation.DSMT4">
                   <p:embed/>
                 </p:oleObj>
               </mc:Choice>
@@ -6500,7 +6500,7 @@
           <a:graphicData uri="http://schemas.openxmlformats.org/presentationml/2006/ole">
             <mc:AlternateContent xmlns:mc="http://schemas.openxmlformats.org/markup-compatibility/2006">
               <mc:Choice xmlns:v="urn:schemas-microsoft-com:vml" Requires="v">
-                <p:oleObj spid="_x0000_s17433" name="Equation" r:id="rId4" imgW="139700" imgH="215900" progId="Equation.DSMT4">
+                <p:oleObj spid="_x0000_s17437" name="Equation" r:id="rId4" imgW="139700" imgH="215900" progId="Equation.DSMT4">
                   <p:embed/>
                 </p:oleObj>
               </mc:Choice>
@@ -6557,7 +6557,7 @@
           <a:graphicData uri="http://schemas.openxmlformats.org/presentationml/2006/ole">
             <mc:AlternateContent xmlns:mc="http://schemas.openxmlformats.org/markup-compatibility/2006">
               <mc:Choice xmlns:v="urn:schemas-microsoft-com:vml" Requires="v">
-                <p:oleObj spid="_x0000_s17434" name="Equation" r:id="rId6" imgW="1955800" imgH="533400" progId="Equation.DSMT4">
+                <p:oleObj spid="_x0000_s17438" name="Equation" r:id="rId6" imgW="1955800" imgH="533400" progId="Equation.DSMT4">
                   <p:embed/>
                 </p:oleObj>
               </mc:Choice>
@@ -6614,7 +6614,7 @@
           <a:graphicData uri="http://schemas.openxmlformats.org/presentationml/2006/ole">
             <mc:AlternateContent xmlns:mc="http://schemas.openxmlformats.org/markup-compatibility/2006">
               <mc:Choice xmlns:v="urn:schemas-microsoft-com:vml" Requires="v">
-                <p:oleObj spid="_x0000_s17435" name="Equation" r:id="rId8" imgW="812800" imgH="355600" progId="Equation.DSMT4">
+                <p:oleObj spid="_x0000_s17439" name="Equation" r:id="rId8" imgW="812800" imgH="355600" progId="Equation.DSMT4">
                   <p:embed/>
                 </p:oleObj>
               </mc:Choice>
@@ -6781,7 +6781,7 @@
           <a:graphicData uri="http://schemas.openxmlformats.org/presentationml/2006/ole">
             <mc:AlternateContent xmlns:mc="http://schemas.openxmlformats.org/markup-compatibility/2006">
               <mc:Choice xmlns:v="urn:schemas-microsoft-com:vml" Requires="v">
-                <p:oleObj spid="_x0000_s16414" name="Equation" r:id="rId4" imgW="114300" imgH="165100" progId="Equation.3">
+                <p:oleObj spid="_x0000_s16418" name="Equation" r:id="rId4" imgW="114300" imgH="165100" progId="Equation.3">
                   <p:embed/>
                 </p:oleObj>
               </mc:Choice>
@@ -6838,7 +6838,7 @@
           <a:graphicData uri="http://schemas.openxmlformats.org/presentationml/2006/ole">
             <mc:AlternateContent xmlns:mc="http://schemas.openxmlformats.org/markup-compatibility/2006">
               <mc:Choice xmlns:v="urn:schemas-microsoft-com:vml" Requires="v">
-                <p:oleObj spid="_x0000_s16415" name="Equation" r:id="rId6" imgW="939800" imgH="292100" progId="Equation.DSMT4">
+                <p:oleObj spid="_x0000_s16419" name="Equation" r:id="rId6" imgW="939800" imgH="292100" progId="Equation.DSMT4">
                   <p:embed/>
                 </p:oleObj>
               </mc:Choice>
@@ -6895,7 +6895,7 @@
           <a:graphicData uri="http://schemas.openxmlformats.org/presentationml/2006/ole">
             <mc:AlternateContent xmlns:mc="http://schemas.openxmlformats.org/markup-compatibility/2006">
               <mc:Choice xmlns:v="urn:schemas-microsoft-com:vml" Requires="v">
-                <p:oleObj spid="_x0000_s16416" name="Equation" r:id="rId8" imgW="736600" imgH="292100" progId="Equation.DSMT4">
+                <p:oleObj spid="_x0000_s16420" name="Equation" r:id="rId8" imgW="736600" imgH="292100" progId="Equation.DSMT4">
                   <p:embed/>
                 </p:oleObj>
               </mc:Choice>
@@ -7138,7 +7138,7 @@
           <a:graphicData uri="http://schemas.openxmlformats.org/presentationml/2006/ole">
             <mc:AlternateContent xmlns:mc="http://schemas.openxmlformats.org/markup-compatibility/2006">
               <mc:Choice xmlns:v="urn:schemas-microsoft-com:vml" Requires="v">
-                <p:oleObj spid="_x0000_s18472" name="Equation" r:id="rId4" imgW="114300" imgH="165100" progId="Equation.3">
+                <p:oleObj spid="_x0000_s18477" name="Equation" r:id="rId4" imgW="114300" imgH="165100" progId="Equation.3">
                   <p:embed/>
                 </p:oleObj>
               </mc:Choice>
@@ -7195,7 +7195,7 @@
           <a:graphicData uri="http://schemas.openxmlformats.org/presentationml/2006/ole">
             <mc:AlternateContent xmlns:mc="http://schemas.openxmlformats.org/markup-compatibility/2006">
               <mc:Choice xmlns:v="urn:schemas-microsoft-com:vml" Requires="v">
-                <p:oleObj spid="_x0000_s18473" name="Equation" r:id="rId6" imgW="469900" imgH="304800" progId="Equation.3">
+                <p:oleObj spid="_x0000_s18478" name="Equation" r:id="rId6" imgW="469900" imgH="304800" progId="Equation.3">
                   <p:embed/>
                 </p:oleObj>
               </mc:Choice>
@@ -7252,7 +7252,7 @@
           <a:graphicData uri="http://schemas.openxmlformats.org/presentationml/2006/ole">
             <mc:AlternateContent xmlns:mc="http://schemas.openxmlformats.org/markup-compatibility/2006">
               <mc:Choice xmlns:v="urn:schemas-microsoft-com:vml" Requires="v">
-                <p:oleObj spid="_x0000_s18474" name="Equation" r:id="rId8" imgW="596900" imgH="330200" progId="Equation.DSMT4">
+                <p:oleObj spid="_x0000_s18479" name="Equation" r:id="rId8" imgW="596900" imgH="330200" progId="Equation.DSMT4">
                   <p:embed/>
                 </p:oleObj>
               </mc:Choice>
@@ -7309,7 +7309,7 @@
           <a:graphicData uri="http://schemas.openxmlformats.org/presentationml/2006/ole">
             <mc:AlternateContent xmlns:mc="http://schemas.openxmlformats.org/markup-compatibility/2006">
               <mc:Choice xmlns:v="urn:schemas-microsoft-com:vml" Requires="v">
-                <p:oleObj spid="_x0000_s18475" name="Equation" r:id="rId10" imgW="787400" imgH="292100" progId="Equation.DSMT4">
+                <p:oleObj spid="_x0000_s18480" name="Equation" r:id="rId10" imgW="787400" imgH="292100" progId="Equation.DSMT4">
                   <p:embed/>
                 </p:oleObj>
               </mc:Choice>
@@ -7605,7 +7605,7 @@
           <a:graphicData uri="http://schemas.openxmlformats.org/presentationml/2006/ole">
             <mc:AlternateContent xmlns:mc="http://schemas.openxmlformats.org/markup-compatibility/2006">
               <mc:Choice xmlns:v="urn:schemas-microsoft-com:vml" Requires="v">
-                <p:oleObj spid="_x0000_s19484" name="Equation" r:id="rId4" imgW="114300" imgH="165100" progId="Equation.3">
+                <p:oleObj spid="_x0000_s19488" name="Equation" r:id="rId4" imgW="114300" imgH="165100" progId="Equation.3">
                   <p:embed/>
                 </p:oleObj>
               </mc:Choice>
@@ -7662,7 +7662,7 @@
           <a:graphicData uri="http://schemas.openxmlformats.org/presentationml/2006/ole">
             <mc:AlternateContent xmlns:mc="http://schemas.openxmlformats.org/markup-compatibility/2006">
               <mc:Choice xmlns:v="urn:schemas-microsoft-com:vml" Requires="v">
-                <p:oleObj spid="_x0000_s19485" name="Equation" r:id="rId6" imgW="596900" imgH="330200" progId="Equation.DSMT4">
+                <p:oleObj spid="_x0000_s19489" name="Equation" r:id="rId6" imgW="596900" imgH="330200" progId="Equation.DSMT4">
                   <p:embed/>
                 </p:oleObj>
               </mc:Choice>
@@ -7719,7 +7719,7 @@
           <a:graphicData uri="http://schemas.openxmlformats.org/presentationml/2006/ole">
             <mc:AlternateContent xmlns:mc="http://schemas.openxmlformats.org/markup-compatibility/2006">
               <mc:Choice xmlns:v="urn:schemas-microsoft-com:vml" Requires="v">
-                <p:oleObj spid="_x0000_s19486" name="Equation" r:id="rId8" imgW="1689100" imgH="673100" progId="Equation.DSMT4">
+                <p:oleObj spid="_x0000_s19490" name="Equation" r:id="rId8" imgW="1689100" imgH="673100" progId="Equation.DSMT4">
                   <p:embed/>
                 </p:oleObj>
               </mc:Choice>
@@ -7886,7 +7886,7 @@
           <a:graphicData uri="http://schemas.openxmlformats.org/presentationml/2006/ole">
             <mc:AlternateContent xmlns:mc="http://schemas.openxmlformats.org/markup-compatibility/2006">
               <mc:Choice xmlns:v="urn:schemas-microsoft-com:vml" Requires="v">
-                <p:oleObj spid="_x0000_s20509" name="Equation" r:id="rId4" imgW="114300" imgH="165100" progId="Equation.3">
+                <p:oleObj spid="_x0000_s20513" name="Equation" r:id="rId4" imgW="114300" imgH="165100" progId="Equation.3">
                   <p:embed/>
                 </p:oleObj>
               </mc:Choice>
@@ -7943,7 +7943,7 @@
           <a:graphicData uri="http://schemas.openxmlformats.org/presentationml/2006/ole">
             <mc:AlternateContent xmlns:mc="http://schemas.openxmlformats.org/markup-compatibility/2006">
               <mc:Choice xmlns:v="urn:schemas-microsoft-com:vml" Requires="v">
-                <p:oleObj spid="_x0000_s20510" name="Equation" r:id="rId6" imgW="1485900" imgH="292100" progId="Equation.DSMT4">
+                <p:oleObj spid="_x0000_s20514" name="Equation" r:id="rId6" imgW="1485900" imgH="292100" progId="Equation.DSMT4">
                   <p:embed/>
                 </p:oleObj>
               </mc:Choice>
@@ -8000,7 +8000,7 @@
           <a:graphicData uri="http://schemas.openxmlformats.org/presentationml/2006/ole">
             <mc:AlternateContent xmlns:mc="http://schemas.openxmlformats.org/markup-compatibility/2006">
               <mc:Choice xmlns:v="urn:schemas-microsoft-com:vml" Requires="v">
-                <p:oleObj spid="_x0000_s20511" name="Equation" r:id="rId8" imgW="863600" imgH="292100" progId="Equation.DSMT4">
+                <p:oleObj spid="_x0000_s20515" name="Equation" r:id="rId8" imgW="863600" imgH="292100" progId="Equation.DSMT4">
                   <p:embed/>
                 </p:oleObj>
               </mc:Choice>
@@ -8243,7 +8243,7 @@
           <a:graphicData uri="http://schemas.openxmlformats.org/presentationml/2006/ole">
             <mc:AlternateContent xmlns:mc="http://schemas.openxmlformats.org/markup-compatibility/2006">
               <mc:Choice xmlns:v="urn:schemas-microsoft-com:vml" Requires="v">
-                <p:oleObj spid="_x0000_s21535" name="Equation" r:id="rId4" imgW="114300" imgH="165100" progId="Equation.3">
+                <p:oleObj spid="_x0000_s21539" name="Equation" r:id="rId4" imgW="114300" imgH="165100" progId="Equation.3">
                   <p:embed/>
                 </p:oleObj>
               </mc:Choice>
@@ -8300,7 +8300,7 @@
           <a:graphicData uri="http://schemas.openxmlformats.org/presentationml/2006/ole">
             <mc:AlternateContent xmlns:mc="http://schemas.openxmlformats.org/markup-compatibility/2006">
               <mc:Choice xmlns:v="urn:schemas-microsoft-com:vml" Requires="v">
-                <p:oleObj spid="_x0000_s21536" name="Equation" r:id="rId6" imgW="762000" imgH="292100" progId="Equation.DSMT4">
+                <p:oleObj spid="_x0000_s21540" name="Equation" r:id="rId6" imgW="762000" imgH="292100" progId="Equation.DSMT4">
                   <p:embed/>
                 </p:oleObj>
               </mc:Choice>
@@ -8357,7 +8357,7 @@
           <a:graphicData uri="http://schemas.openxmlformats.org/presentationml/2006/ole">
             <mc:AlternateContent xmlns:mc="http://schemas.openxmlformats.org/markup-compatibility/2006">
               <mc:Choice xmlns:v="urn:schemas-microsoft-com:vml" Requires="v">
-                <p:oleObj spid="_x0000_s21537" name="Equation" r:id="rId8" imgW="635000" imgH="292100" progId="Equation.DSMT4">
+                <p:oleObj spid="_x0000_s21541" name="Equation" r:id="rId8" imgW="635000" imgH="292100" progId="Equation.DSMT4">
                   <p:embed/>
                 </p:oleObj>
               </mc:Choice>
@@ -8898,7 +8898,7 @@
           <a:graphicData uri="http://schemas.openxmlformats.org/presentationml/2006/ole">
             <mc:AlternateContent xmlns:mc="http://schemas.openxmlformats.org/markup-compatibility/2006">
               <mc:Choice xmlns:v="urn:schemas-microsoft-com:vml" Requires="v">
-                <p:oleObj spid="_x0000_s28689" name="Equation" r:id="rId4" imgW="368300" imgH="292100" progId="Equation.DSMT4">
+                <p:oleObj spid="_x0000_s28692" name="Equation" r:id="rId4" imgW="368300" imgH="292100" progId="Equation.DSMT4">
                   <p:embed/>
                 </p:oleObj>
               </mc:Choice>
@@ -9022,7 +9022,7 @@
             <a:graphicData uri="http://schemas.openxmlformats.org/presentationml/2006/ole">
               <mc:AlternateContent xmlns:mc="http://schemas.openxmlformats.org/markup-compatibility/2006">
                 <mc:Choice xmlns:v="urn:schemas-microsoft-com:vml" Requires="v">
-                  <p:oleObj spid="_x0000_s28690" name="Equation" r:id="rId6" imgW="203200" imgH="292100" progId="Equation.DSMT4">
+                  <p:oleObj spid="_x0000_s28693" name="Equation" r:id="rId6" imgW="203200" imgH="292100" progId="Equation.DSMT4">
                     <p:embed/>
                   </p:oleObj>
                 </mc:Choice>
@@ -9917,7 +9917,7 @@
           <a:graphicData uri="http://schemas.openxmlformats.org/presentationml/2006/ole">
             <mc:AlternateContent xmlns:mc="http://schemas.openxmlformats.org/markup-compatibility/2006">
               <mc:Choice xmlns:v="urn:schemas-microsoft-com:vml" Requires="v">
-                <p:oleObj spid="_x0000_s29713" name="Equation" r:id="rId4" imgW="368300" imgH="292100" progId="Equation.DSMT4">
+                <p:oleObj spid="_x0000_s29716" name="Equation" r:id="rId4" imgW="368300" imgH="292100" progId="Equation.DSMT4">
                   <p:embed/>
                 </p:oleObj>
               </mc:Choice>
@@ -10041,7 +10041,7 @@
             <a:graphicData uri="http://schemas.openxmlformats.org/presentationml/2006/ole">
               <mc:AlternateContent xmlns:mc="http://schemas.openxmlformats.org/markup-compatibility/2006">
                 <mc:Choice xmlns:v="urn:schemas-microsoft-com:vml" Requires="v">
-                  <p:oleObj spid="_x0000_s29714" name="Equation" r:id="rId6" imgW="203200" imgH="292100" progId="Equation.DSMT4">
+                  <p:oleObj spid="_x0000_s29717" name="Equation" r:id="rId6" imgW="203200" imgH="292100" progId="Equation.DSMT4">
                     <p:embed/>
                   </p:oleObj>
                 </mc:Choice>
@@ -10148,7 +10148,7 @@
           <a:graphicData uri="http://schemas.openxmlformats.org/presentationml/2006/ole">
             <mc:AlternateContent xmlns:mc="http://schemas.openxmlformats.org/markup-compatibility/2006">
               <mc:Choice xmlns:v="urn:schemas-microsoft-com:vml" Requires="v">
-                <p:oleObj spid="_x0000_s6207" name="Equation" r:id="rId4" imgW="203200" imgH="292100" progId="Equation.DSMT4">
+                <p:oleObj spid="_x0000_s6212" name="Equation" r:id="rId4" imgW="203200" imgH="292100" progId="Equation.DSMT4">
                   <p:embed/>
                 </p:oleObj>
               </mc:Choice>
@@ -10356,7 +10356,7 @@
           <a:graphicData uri="http://schemas.openxmlformats.org/presentationml/2006/ole">
             <mc:AlternateContent xmlns:mc="http://schemas.openxmlformats.org/markup-compatibility/2006">
               <mc:Choice xmlns:v="urn:schemas-microsoft-com:vml" Requires="v">
-                <p:oleObj spid="_x0000_s6208" name="Equation" r:id="rId6" imgW="203200" imgH="292100" progId="Equation.DSMT4">
+                <p:oleObj spid="_x0000_s6213" name="Equation" r:id="rId6" imgW="203200" imgH="292100" progId="Equation.DSMT4">
                   <p:embed/>
                 </p:oleObj>
               </mc:Choice>
@@ -10476,7 +10476,7 @@
           <a:graphicData uri="http://schemas.openxmlformats.org/presentationml/2006/ole">
             <mc:AlternateContent xmlns:mc="http://schemas.openxmlformats.org/markup-compatibility/2006">
               <mc:Choice xmlns:v="urn:schemas-microsoft-com:vml" Requires="v">
-                <p:oleObj spid="_x0000_s6209" name="Equation" r:id="rId8" imgW="1943100" imgH="558800" progId="Equation.DSMT4">
+                <p:oleObj spid="_x0000_s6214" name="Equation" r:id="rId8" imgW="1943100" imgH="558800" progId="Equation.DSMT4">
                   <p:embed/>
                 </p:oleObj>
               </mc:Choice>
@@ -10533,7 +10533,7 @@
           <a:graphicData uri="http://schemas.openxmlformats.org/presentationml/2006/ole">
             <mc:AlternateContent xmlns:mc="http://schemas.openxmlformats.org/markup-compatibility/2006">
               <mc:Choice xmlns:v="urn:schemas-microsoft-com:vml" Requires="v">
-                <p:oleObj spid="_x0000_s6210" name="Equation" r:id="rId10" imgW="660400" imgH="292100" progId="Equation.DSMT4">
+                <p:oleObj spid="_x0000_s6215" name="Equation" r:id="rId10" imgW="660400" imgH="292100" progId="Equation.DSMT4">
                   <p:embed/>
                 </p:oleObj>
               </mc:Choice>
@@ -11759,7 +11759,7 @@
             <a:graphicData uri="http://schemas.openxmlformats.org/presentationml/2006/ole">
               <mc:AlternateContent xmlns:mc="http://schemas.openxmlformats.org/markup-compatibility/2006">
                 <mc:Choice xmlns:v="urn:schemas-microsoft-com:vml" Requires="v">
-                  <p:oleObj spid="_x0000_s30738" name="Equation" r:id="rId4" imgW="203200" imgH="292100" progId="Equation.DSMT4">
+                  <p:oleObj spid="_x0000_s30741" name="Equation" r:id="rId4" imgW="203200" imgH="292100" progId="Equation.DSMT4">
                     <p:embed/>
                   </p:oleObj>
                 </mc:Choice>
@@ -11817,7 +11817,7 @@
           <a:graphicData uri="http://schemas.openxmlformats.org/presentationml/2006/ole">
             <mc:AlternateContent xmlns:mc="http://schemas.openxmlformats.org/markup-compatibility/2006">
               <mc:Choice xmlns:v="urn:schemas-microsoft-com:vml" Requires="v">
-                <p:oleObj spid="_x0000_s30739" name="Equation" r:id="rId6" imgW="368300" imgH="292100" progId="Equation.DSMT4">
+                <p:oleObj spid="_x0000_s30742" name="Equation" r:id="rId6" imgW="368300" imgH="292100" progId="Equation.DSMT4">
                   <p:embed/>
                 </p:oleObj>
               </mc:Choice>
@@ -11984,7 +11984,7 @@
           <a:graphicData uri="http://schemas.openxmlformats.org/presentationml/2006/ole">
             <mc:AlternateContent xmlns:mc="http://schemas.openxmlformats.org/markup-compatibility/2006">
               <mc:Choice xmlns:v="urn:schemas-microsoft-com:vml" Requires="v">
-                <p:oleObj spid="_x0000_s34824" name="Equation" r:id="rId4" imgW="114300" imgH="165100" progId="Equation.3">
+                <p:oleObj spid="_x0000_s34828" name="Equation" r:id="rId4" imgW="114300" imgH="165100" progId="Equation.3">
                   <p:embed/>
                 </p:oleObj>
               </mc:Choice>
@@ -12041,7 +12041,7 @@
           <a:graphicData uri="http://schemas.openxmlformats.org/presentationml/2006/ole">
             <mc:AlternateContent xmlns:mc="http://schemas.openxmlformats.org/markup-compatibility/2006">
               <mc:Choice xmlns:v="urn:schemas-microsoft-com:vml" Requires="v">
-                <p:oleObj spid="_x0000_s34825" name="Equation" r:id="rId6" imgW="762000" imgH="292100" progId="Equation.DSMT4">
+                <p:oleObj spid="_x0000_s34829" name="Equation" r:id="rId6" imgW="762000" imgH="292100" progId="Equation.DSMT4">
                   <p:embed/>
                 </p:oleObj>
               </mc:Choice>
@@ -12098,7 +12098,7 @@
           <a:graphicData uri="http://schemas.openxmlformats.org/presentationml/2006/ole">
             <mc:AlternateContent xmlns:mc="http://schemas.openxmlformats.org/markup-compatibility/2006">
               <mc:Choice xmlns:v="urn:schemas-microsoft-com:vml" Requires="v">
-                <p:oleObj spid="_x0000_s34826" name="Equation" r:id="rId8" imgW="635000" imgH="292100" progId="Equation.DSMT4">
+                <p:oleObj spid="_x0000_s34830" name="Equation" r:id="rId8" imgW="635000" imgH="292100" progId="Equation.DSMT4">
                   <p:embed/>
                 </p:oleObj>
               </mc:Choice>
@@ -12256,7 +12256,7 @@
           <a:graphicData uri="http://schemas.openxmlformats.org/presentationml/2006/ole">
             <mc:AlternateContent xmlns:mc="http://schemas.openxmlformats.org/markup-compatibility/2006">
               <mc:Choice xmlns:v="urn:schemas-microsoft-com:vml" Requires="v">
-                <p:oleObj spid="_x0000_s24600" name="Equation" r:id="rId4" imgW="114300" imgH="165100" progId="Equation.3">
+                <p:oleObj spid="_x0000_s24603" name="Equation" r:id="rId4" imgW="114300" imgH="165100" progId="Equation.3">
                   <p:embed/>
                 </p:oleObj>
               </mc:Choice>
@@ -12313,7 +12313,7 @@
           <a:graphicData uri="http://schemas.openxmlformats.org/presentationml/2006/ole">
             <mc:AlternateContent xmlns:mc="http://schemas.openxmlformats.org/markup-compatibility/2006">
               <mc:Choice xmlns:v="urn:schemas-microsoft-com:vml" Requires="v">
-                <p:oleObj spid="_x0000_s24601" name="Equation" r:id="rId6" imgW="990600" imgH="292100" progId="Equation.DSMT4">
+                <p:oleObj spid="_x0000_s24604" name="Equation" r:id="rId6" imgW="990600" imgH="292100" progId="Equation.DSMT4">
                   <p:embed/>
                 </p:oleObj>
               </mc:Choice>
@@ -12403,9 +12403,6 @@
               </a:rPr>
               <a:t>product</a:t>
             </a:r>
-            <a:endParaRPr lang="en-US" sz="4800" dirty="0" smtClean="0">
-              <a:latin typeface="+mj-lt"/>
-            </a:endParaRPr>
           </a:p>
         </p:txBody>
       </p:sp>
@@ -12623,7 +12620,7 @@
           <a:graphicData uri="http://schemas.openxmlformats.org/presentationml/2006/ole">
             <mc:AlternateContent xmlns:mc="http://schemas.openxmlformats.org/markup-compatibility/2006">
               <mc:Choice xmlns:v="urn:schemas-microsoft-com:vml" Requires="v">
-                <p:oleObj spid="_x0000_s27666" name="Equation" r:id="rId4" imgW="114300" imgH="165100" progId="Equation.3">
+                <p:oleObj spid="_x0000_s27669" name="Equation" r:id="rId4" imgW="114300" imgH="165100" progId="Equation.3">
                   <p:embed/>
                 </p:oleObj>
               </mc:Choice>
@@ -12680,7 +12677,7 @@
           <a:graphicData uri="http://schemas.openxmlformats.org/presentationml/2006/ole">
             <mc:AlternateContent xmlns:mc="http://schemas.openxmlformats.org/markup-compatibility/2006">
               <mc:Choice xmlns:v="urn:schemas-microsoft-com:vml" Requires="v">
-                <p:oleObj spid="_x0000_s27667" name="Equation" r:id="rId6" imgW="1231900" imgH="558800" progId="Equation.DSMT4">
+                <p:oleObj spid="_x0000_s27670" name="Equation" r:id="rId6" imgW="1231900" imgH="558800" progId="Equation.DSMT4">
                   <p:embed/>
                 </p:oleObj>
               </mc:Choice>
@@ -12852,7 +12849,7 @@
           <a:graphicData uri="http://schemas.openxmlformats.org/presentationml/2006/ole">
             <mc:AlternateContent xmlns:mc="http://schemas.openxmlformats.org/markup-compatibility/2006">
               <mc:Choice xmlns:v="urn:schemas-microsoft-com:vml" Requires="v">
-                <p:oleObj spid="_x0000_s26643" name="Equation" r:id="rId4" imgW="114300" imgH="165100" progId="Equation.3">
+                <p:oleObj spid="_x0000_s26646" name="Equation" r:id="rId4" imgW="114300" imgH="165100" progId="Equation.3">
                   <p:embed/>
                 </p:oleObj>
               </mc:Choice>
@@ -12909,7 +12906,7 @@
           <a:graphicData uri="http://schemas.openxmlformats.org/presentationml/2006/ole">
             <mc:AlternateContent xmlns:mc="http://schemas.openxmlformats.org/markup-compatibility/2006">
               <mc:Choice xmlns:v="urn:schemas-microsoft-com:vml" Requires="v">
-                <p:oleObj spid="_x0000_s26644" name="Equation" r:id="rId6" imgW="1206500" imgH="558800" progId="Equation.3">
+                <p:oleObj spid="_x0000_s26647" name="Equation" r:id="rId6" imgW="1206500" imgH="558800" progId="Equation.3">
                   <p:embed/>
                 </p:oleObj>
               </mc:Choice>
@@ -13226,7 +13223,7 @@
           <a:graphicData uri="http://schemas.openxmlformats.org/presentationml/2006/ole">
             <mc:AlternateContent xmlns:mc="http://schemas.openxmlformats.org/markup-compatibility/2006">
               <mc:Choice xmlns:v="urn:schemas-microsoft-com:vml" Requires="v">
-                <p:oleObj spid="_x0000_s38915" name="Equation" r:id="rId4" imgW="114300" imgH="165100" progId="Equation.3">
+                <p:oleObj spid="_x0000_s38918" name="Equation" r:id="rId4" imgW="114300" imgH="165100" progId="Equation.3">
                   <p:embed/>
                 </p:oleObj>
               </mc:Choice>
@@ -13283,7 +13280,7 @@
           <a:graphicData uri="http://schemas.openxmlformats.org/presentationml/2006/ole">
             <mc:AlternateContent xmlns:mc="http://schemas.openxmlformats.org/markup-compatibility/2006">
               <mc:Choice xmlns:v="urn:schemas-microsoft-com:vml" Requires="v">
-                <p:oleObj spid="_x0000_s38916" name="Equation" r:id="rId6" imgW="825500" imgH="457200" progId="Equation.DSMT4">
+                <p:oleObj spid="_x0000_s38919" name="Equation" r:id="rId6" imgW="825500" imgH="457200" progId="Equation.DSMT4">
                   <p:embed/>
                 </p:oleObj>
               </mc:Choice>
@@ -13455,7 +13452,7 @@
           <a:graphicData uri="http://schemas.openxmlformats.org/presentationml/2006/ole">
             <mc:AlternateContent xmlns:mc="http://schemas.openxmlformats.org/markup-compatibility/2006">
               <mc:Choice xmlns:v="urn:schemas-microsoft-com:vml" Requires="v">
-                <p:oleObj spid="_x0000_s23579" name="Equation" r:id="rId4" imgW="114300" imgH="165100" progId="Equation.3">
+                <p:oleObj spid="_x0000_s23582" name="Equation" r:id="rId4" imgW="114300" imgH="165100" progId="Equation.3">
                   <p:embed/>
                 </p:oleObj>
               </mc:Choice>
@@ -13512,7 +13509,7 @@
           <a:graphicData uri="http://schemas.openxmlformats.org/presentationml/2006/ole">
             <mc:AlternateContent xmlns:mc="http://schemas.openxmlformats.org/markup-compatibility/2006">
               <mc:Choice xmlns:v="urn:schemas-microsoft-com:vml" Requires="v">
-                <p:oleObj spid="_x0000_s23580" name="Equation" r:id="rId6" imgW="863600" imgH="279400" progId="Equation.3">
+                <p:oleObj spid="_x0000_s23583" name="Equation" r:id="rId6" imgW="863600" imgH="279400" progId="Equation.3">
                   <p:embed/>
                 </p:oleObj>
               </mc:Choice>
@@ -13901,7 +13898,7 @@
           <a:graphicData uri="http://schemas.openxmlformats.org/presentationml/2006/ole">
             <mc:AlternateContent xmlns:mc="http://schemas.openxmlformats.org/markup-compatibility/2006">
               <mc:Choice xmlns:v="urn:schemas-microsoft-com:vml" Requires="v">
-                <p:oleObj spid="_x0000_s22563" name="Equation" r:id="rId4" imgW="114300" imgH="165100" progId="Equation.3">
+                <p:oleObj spid="_x0000_s22568" name="Equation" r:id="rId4" imgW="114300" imgH="165100" progId="Equation.3">
                   <p:embed/>
                 </p:oleObj>
               </mc:Choice>
@@ -13958,7 +13955,7 @@
           <a:graphicData uri="http://schemas.openxmlformats.org/presentationml/2006/ole">
             <mc:AlternateContent xmlns:mc="http://schemas.openxmlformats.org/markup-compatibility/2006">
               <mc:Choice xmlns:v="urn:schemas-microsoft-com:vml" Requires="v">
-                <p:oleObj spid="_x0000_s22564" name="Equation" r:id="rId6" imgW="762000" imgH="292100" progId="Equation.DSMT4">
+                <p:oleObj spid="_x0000_s22569" name="Equation" r:id="rId6" imgW="762000" imgH="292100" progId="Equation.DSMT4">
                   <p:embed/>
                 </p:oleObj>
               </mc:Choice>
@@ -14015,7 +14012,7 @@
           <a:graphicData uri="http://schemas.openxmlformats.org/presentationml/2006/ole">
             <mc:AlternateContent xmlns:mc="http://schemas.openxmlformats.org/markup-compatibility/2006">
               <mc:Choice xmlns:v="urn:schemas-microsoft-com:vml" Requires="v">
-                <p:oleObj spid="_x0000_s22565" name="Equation" r:id="rId8" imgW="1790700" imgH="584200" progId="Equation.DSMT4">
+                <p:oleObj spid="_x0000_s22570" name="Equation" r:id="rId8" imgW="1790700" imgH="584200" progId="Equation.DSMT4">
                   <p:embed/>
                 </p:oleObj>
               </mc:Choice>
@@ -14072,7 +14069,7 @@
           <a:graphicData uri="http://schemas.openxmlformats.org/presentationml/2006/ole">
             <mc:AlternateContent xmlns:mc="http://schemas.openxmlformats.org/markup-compatibility/2006">
               <mc:Choice xmlns:v="urn:schemas-microsoft-com:vml" Requires="v">
-                <p:oleObj spid="_x0000_s22566" name="Equation" r:id="rId10" imgW="1485900" imgH="330200" progId="Equation.DSMT4">
+                <p:oleObj spid="_x0000_s22571" name="Equation" r:id="rId10" imgW="1485900" imgH="330200" progId="Equation.DSMT4">
                   <p:embed/>
                 </p:oleObj>
               </mc:Choice>
@@ -14233,7 +14230,7 @@
           <a:graphicData uri="http://schemas.openxmlformats.org/presentationml/2006/ole">
             <mc:AlternateContent xmlns:mc="http://schemas.openxmlformats.org/markup-compatibility/2006">
               <mc:Choice xmlns:v="urn:schemas-microsoft-com:vml" Requires="v">
-                <p:oleObj spid="_x0000_s1055" name="Equation" r:id="rId4" imgW="126720" imgH="190440" progId="Equation.DSMT4">
+                <p:oleObj spid="_x0000_s1058" name="Equation" r:id="rId4" imgW="126720" imgH="190440" progId="Equation.DSMT4">
                   <p:embed/>
                 </p:oleObj>
               </mc:Choice>
@@ -14334,7 +14331,7 @@
           <a:graphicData uri="http://schemas.openxmlformats.org/presentationml/2006/ole">
             <mc:AlternateContent xmlns:mc="http://schemas.openxmlformats.org/markup-compatibility/2006">
               <mc:Choice xmlns:v="urn:schemas-microsoft-com:vml" Requires="v">
-                <p:oleObj spid="_x0000_s1056" name="Equation" r:id="rId6" imgW="2044700" imgH="647700" progId="Equation.3">
+                <p:oleObj spid="_x0000_s1059" name="Equation" r:id="rId6" imgW="2044700" imgH="647700" progId="Equation.3">
                   <p:embed/>
                 </p:oleObj>
               </mc:Choice>
@@ -14593,7 +14590,7 @@
           <a:graphicData uri="http://schemas.openxmlformats.org/presentationml/2006/ole">
             <mc:AlternateContent xmlns:mc="http://schemas.openxmlformats.org/markup-compatibility/2006">
               <mc:Choice xmlns:v="urn:schemas-microsoft-com:vml" Requires="v">
-                <p:oleObj spid="_x0000_s2079" name="Equation" r:id="rId4" imgW="126720" imgH="190440" progId="Equation.DSMT4">
+                <p:oleObj spid="_x0000_s2082" name="Equation" r:id="rId4" imgW="126720" imgH="190440" progId="Equation.DSMT4">
                   <p:embed/>
                 </p:oleObj>
               </mc:Choice>
@@ -14663,7 +14660,7 @@
           <a:graphicData uri="http://schemas.openxmlformats.org/presentationml/2006/ole">
             <mc:AlternateContent xmlns:mc="http://schemas.openxmlformats.org/markup-compatibility/2006">
               <mc:Choice xmlns:v="urn:schemas-microsoft-com:vml" Requires="v">
-                <p:oleObj spid="_x0000_s2080" name="Equation" r:id="rId6" imgW="2044700" imgH="812800" progId="Equation.3">
+                <p:oleObj spid="_x0000_s2083" name="Equation" r:id="rId6" imgW="2044700" imgH="812800" progId="Equation.3">
                   <p:embed/>
                 </p:oleObj>
               </mc:Choice>
@@ -14819,7 +14816,7 @@
           <a:graphicData uri="http://schemas.openxmlformats.org/presentationml/2006/ole">
             <mc:AlternateContent xmlns:mc="http://schemas.openxmlformats.org/markup-compatibility/2006">
               <mc:Choice xmlns:v="urn:schemas-microsoft-com:vml" Requires="v">
-                <p:oleObj spid="_x0000_s7198" name="Equation" r:id="rId4" imgW="1447800" imgH="292100" progId="Equation.DSMT4">
+                <p:oleObj spid="_x0000_s7201" name="Equation" r:id="rId4" imgW="1447800" imgH="292100" progId="Equation.DSMT4">
                   <p:embed/>
                 </p:oleObj>
               </mc:Choice>
@@ -14876,7 +14873,7 @@
           <a:graphicData uri="http://schemas.openxmlformats.org/presentationml/2006/ole">
             <mc:AlternateContent xmlns:mc="http://schemas.openxmlformats.org/markup-compatibility/2006">
               <mc:Choice xmlns:v="urn:schemas-microsoft-com:vml" Requires="v">
-                <p:oleObj spid="_x0000_s7199" name="Equation" r:id="rId6" imgW="2451100" imgH="558800" progId="Equation.DSMT4">
+                <p:oleObj spid="_x0000_s7202" name="Equation" r:id="rId6" imgW="2451100" imgH="558800" progId="Equation.DSMT4">
                   <p:embed/>
                 </p:oleObj>
               </mc:Choice>
@@ -14976,7 +14973,7 @@
           <a:graphicData uri="http://schemas.openxmlformats.org/presentationml/2006/ole">
             <mc:AlternateContent xmlns:mc="http://schemas.openxmlformats.org/markup-compatibility/2006">
               <mc:Choice xmlns:v="urn:schemas-microsoft-com:vml" Requires="v">
-                <p:oleObj spid="_x0000_s3103" name="Equation" r:id="rId4" imgW="2031840" imgH="736560" progId="Equation.DSMT4">
+                <p:oleObj spid="_x0000_s3106" name="Equation" r:id="rId4" imgW="2031840" imgH="736560" progId="Equation.DSMT4">
                   <p:embed/>
                 </p:oleObj>
               </mc:Choice>
@@ -15100,7 +15097,7 @@
           <a:graphicData uri="http://schemas.openxmlformats.org/presentationml/2006/ole">
             <mc:AlternateContent xmlns:mc="http://schemas.openxmlformats.org/markup-compatibility/2006">
               <mc:Choice xmlns:v="urn:schemas-microsoft-com:vml" Requires="v">
-                <p:oleObj spid="_x0000_s3104" name="Equation" r:id="rId6" imgW="126720" imgH="190440" progId="Equation.3">
+                <p:oleObj spid="_x0000_s3107" name="Equation" r:id="rId6" imgW="126720" imgH="190440" progId="Equation.3">
                   <p:embed/>
                 </p:oleObj>
               </mc:Choice>
@@ -15527,7 +15524,7 @@
           <a:graphicData uri="http://schemas.openxmlformats.org/presentationml/2006/ole">
             <mc:AlternateContent xmlns:mc="http://schemas.openxmlformats.org/markup-compatibility/2006">
               <mc:Choice xmlns:v="urn:schemas-microsoft-com:vml" Requires="v">
-                <p:oleObj spid="_x0000_s4139" name="Equation" r:id="rId4" imgW="126720" imgH="190440" progId="Equation.DSMT4">
+                <p:oleObj spid="_x0000_s4143" name="Equation" r:id="rId4" imgW="126720" imgH="190440" progId="Equation.DSMT4">
                   <p:embed/>
                 </p:oleObj>
               </mc:Choice>
@@ -15597,7 +15594,7 @@
           <a:graphicData uri="http://schemas.openxmlformats.org/presentationml/2006/ole">
             <mc:AlternateContent xmlns:mc="http://schemas.openxmlformats.org/markup-compatibility/2006">
               <mc:Choice xmlns:v="urn:schemas-microsoft-com:vml" Requires="v">
-                <p:oleObj spid="_x0000_s4140" name="Equation" r:id="rId6" imgW="393480" imgH="342720" progId="Equation.DSMT4">
+                <p:oleObj spid="_x0000_s4144" name="Equation" r:id="rId6" imgW="393480" imgH="342720" progId="Equation.DSMT4">
                   <p:embed/>
                 </p:oleObj>
               </mc:Choice>
@@ -15667,7 +15664,7 @@
           <a:graphicData uri="http://schemas.openxmlformats.org/presentationml/2006/ole">
             <mc:AlternateContent xmlns:mc="http://schemas.openxmlformats.org/markup-compatibility/2006">
               <mc:Choice xmlns:v="urn:schemas-microsoft-com:vml" Requires="v">
-                <p:oleObj spid="_x0000_s4141" name="Equation" r:id="rId8" imgW="1917360" imgH="711000" progId="Equation.3">
+                <p:oleObj spid="_x0000_s4145" name="Equation" r:id="rId8" imgW="1917360" imgH="711000" progId="Equation.3">
                   <p:embed/>
                 </p:oleObj>
               </mc:Choice>
@@ -16274,7 +16271,7 @@
           <a:graphicData uri="http://schemas.openxmlformats.org/presentationml/2006/ole">
             <mc:AlternateContent xmlns:mc="http://schemas.openxmlformats.org/markup-compatibility/2006">
               <mc:Choice xmlns:v="urn:schemas-microsoft-com:vml" Requires="v">
-                <p:oleObj spid="_x0000_s9247" name="Equation" r:id="rId4" imgW="990600" imgH="292100" progId="Equation.DSMT4">
+                <p:oleObj spid="_x0000_s9251" name="Equation" r:id="rId4" imgW="990600" imgH="292100" progId="Equation.DSMT4">
                   <p:embed/>
                 </p:oleObj>
               </mc:Choice>
@@ -16331,7 +16328,7 @@
           <a:graphicData uri="http://schemas.openxmlformats.org/presentationml/2006/ole">
             <mc:AlternateContent xmlns:mc="http://schemas.openxmlformats.org/markup-compatibility/2006">
               <mc:Choice xmlns:v="urn:schemas-microsoft-com:vml" Requires="v">
-                <p:oleObj spid="_x0000_s9248" name="Equation" r:id="rId6" imgW="1130300" imgH="292100" progId="Equation.DSMT4">
+                <p:oleObj spid="_x0000_s9252" name="Equation" r:id="rId6" imgW="1130300" imgH="292100" progId="Equation.DSMT4">
                   <p:embed/>
                 </p:oleObj>
               </mc:Choice>
@@ -16388,7 +16385,7 @@
           <a:graphicData uri="http://schemas.openxmlformats.org/presentationml/2006/ole">
             <mc:AlternateContent xmlns:mc="http://schemas.openxmlformats.org/markup-compatibility/2006">
               <mc:Choice xmlns:v="urn:schemas-microsoft-com:vml" Requires="v">
-                <p:oleObj spid="_x0000_s9249" name="Equation" r:id="rId8" imgW="1130300" imgH="292100" progId="Equation.DSMT4">
+                <p:oleObj spid="_x0000_s9253" name="Equation" r:id="rId8" imgW="1130300" imgH="292100" progId="Equation.DSMT4">
                   <p:embed/>
                 </p:oleObj>
               </mc:Choice>
@@ -16740,7 +16737,7 @@
           <a:graphicData uri="http://schemas.openxmlformats.org/presentationml/2006/ole">
             <mc:AlternateContent xmlns:mc="http://schemas.openxmlformats.org/markup-compatibility/2006">
               <mc:Choice xmlns:v="urn:schemas-microsoft-com:vml" Requires="v">
-                <p:oleObj spid="_x0000_s12308" name="Equation" r:id="rId4" imgW="1701800" imgH="558800" progId="Equation.DSMT4">
+                <p:oleObj spid="_x0000_s12311" name="Equation" r:id="rId4" imgW="1701800" imgH="558800" progId="Equation.DSMT4">
                   <p:embed/>
                 </p:oleObj>
               </mc:Choice>
@@ -16797,7 +16794,7 @@
           <a:graphicData uri="http://schemas.openxmlformats.org/presentationml/2006/ole">
             <mc:AlternateContent xmlns:mc="http://schemas.openxmlformats.org/markup-compatibility/2006">
               <mc:Choice xmlns:v="urn:schemas-microsoft-com:vml" Requires="v">
-                <p:oleObj spid="_x0000_s12309" name="Equation" r:id="rId6" imgW="889000" imgH="292100" progId="Equation.DSMT4">
+                <p:oleObj spid="_x0000_s12312" name="Equation" r:id="rId6" imgW="889000" imgH="292100" progId="Equation.DSMT4">
                   <p:embed/>
                 </p:oleObj>
               </mc:Choice>
@@ -17035,7 +17032,7 @@
           <a:graphicData uri="http://schemas.openxmlformats.org/presentationml/2006/ole">
             <mc:AlternateContent xmlns:mc="http://schemas.openxmlformats.org/markup-compatibility/2006">
               <mc:Choice xmlns:v="urn:schemas-microsoft-com:vml" Requires="v">
-                <p:oleObj spid="_x0000_s10270" name="Equation" r:id="rId4" imgW="1473200" imgH="482600" progId="Equation.DSMT4">
+                <p:oleObj spid="_x0000_s10273" name="Equation" r:id="rId4" imgW="1473200" imgH="482600" progId="Equation.DSMT4">
                   <p:embed/>
                 </p:oleObj>
               </mc:Choice>
@@ -17130,7 +17127,7 @@
           <a:graphicData uri="http://schemas.openxmlformats.org/presentationml/2006/ole">
             <mc:AlternateContent xmlns:mc="http://schemas.openxmlformats.org/markup-compatibility/2006">
               <mc:Choice xmlns:v="urn:schemas-microsoft-com:vml" Requires="v">
-                <p:oleObj spid="_x0000_s10271" name="Equation" r:id="rId6" imgW="1562100" imgH="304800" progId="Equation.3">
+                <p:oleObj spid="_x0000_s10274" name="Equation" r:id="rId6" imgW="1562100" imgH="304800" progId="Equation.3">
                   <p:embed/>
                 </p:oleObj>
               </mc:Choice>
@@ -17542,7 +17539,7 @@
           <a:graphicData uri="http://schemas.openxmlformats.org/presentationml/2006/ole">
             <mc:AlternateContent xmlns:mc="http://schemas.openxmlformats.org/markup-compatibility/2006">
               <mc:Choice xmlns:v="urn:schemas-microsoft-com:vml" Requires="v">
-                <p:oleObj spid="_x0000_s8217" name="Equation" r:id="rId4" imgW="203200" imgH="292100" progId="Equation.DSMT4">
+                <p:oleObj spid="_x0000_s8220" name="Equation" r:id="rId4" imgW="203200" imgH="292100" progId="Equation.DSMT4">
                   <p:embed/>
                 </p:oleObj>
               </mc:Choice>
@@ -17599,7 +17596,7 @@
           <a:graphicData uri="http://schemas.openxmlformats.org/presentationml/2006/ole">
             <mc:AlternateContent xmlns:mc="http://schemas.openxmlformats.org/markup-compatibility/2006">
               <mc:Choice xmlns:v="urn:schemas-microsoft-com:vml" Requires="v">
-                <p:oleObj spid="_x0000_s8218" name="Equation" r:id="rId6" imgW="2616200" imgH="914400" progId="Equation.DSMT4">
+                <p:oleObj spid="_x0000_s8221" name="Equation" r:id="rId6" imgW="2616200" imgH="914400" progId="Equation.DSMT4">
                   <p:embed/>
                 </p:oleObj>
               </mc:Choice>
@@ -17781,7 +17778,7 @@
           <a:graphicData uri="http://schemas.openxmlformats.org/presentationml/2006/ole">
             <mc:AlternateContent xmlns:mc="http://schemas.openxmlformats.org/markup-compatibility/2006">
               <mc:Choice xmlns:v="urn:schemas-microsoft-com:vml" Requires="v">
-                <p:oleObj spid="_x0000_s11292" name="Equation" r:id="rId4" imgW="2336800" imgH="914400" progId="Equation.DSMT4">
+                <p:oleObj spid="_x0000_s11295" name="Equation" r:id="rId4" imgW="2336800" imgH="914400" progId="Equation.DSMT4">
                   <p:embed/>
                 </p:oleObj>
               </mc:Choice>
@@ -18068,7 +18065,7 @@
           <a:graphicData uri="http://schemas.openxmlformats.org/presentationml/2006/ole">
             <mc:AlternateContent xmlns:mc="http://schemas.openxmlformats.org/markup-compatibility/2006">
               <mc:Choice xmlns:v="urn:schemas-microsoft-com:vml" Requires="v">
-                <p:oleObj spid="_x0000_s11293" name="Equation" r:id="rId6" imgW="203200" imgH="292100" progId="Equation.DSMT4">
+                <p:oleObj spid="_x0000_s11296" name="Equation" r:id="rId6" imgW="203200" imgH="292100" progId="Equation.DSMT4">
                   <p:embed/>
                 </p:oleObj>
               </mc:Choice>
@@ -18483,7 +18480,7 @@
           <a:graphicData uri="http://schemas.openxmlformats.org/presentationml/2006/ole">
             <mc:AlternateContent xmlns:mc="http://schemas.openxmlformats.org/markup-compatibility/2006">
               <mc:Choice xmlns:v="urn:schemas-microsoft-com:vml" Requires="v">
-                <p:oleObj spid="_x0000_s13346" name="Equation" r:id="rId4" imgW="203200" imgH="292100" progId="Equation.DSMT4">
+                <p:oleObj spid="_x0000_s13350" name="Equation" r:id="rId4" imgW="203200" imgH="292100" progId="Equation.DSMT4">
                   <p:embed/>
                 </p:oleObj>
               </mc:Choice>
@@ -18540,7 +18537,7 @@
           <a:graphicData uri="http://schemas.openxmlformats.org/presentationml/2006/ole">
             <mc:AlternateContent xmlns:mc="http://schemas.openxmlformats.org/markup-compatibility/2006">
               <mc:Choice xmlns:v="urn:schemas-microsoft-com:vml" Requires="v">
-                <p:oleObj spid="_x0000_s13347" name="Equation" r:id="rId6" imgW="139700" imgH="215900" progId="Equation.DSMT4">
+                <p:oleObj spid="_x0000_s13351" name="Equation" r:id="rId6" imgW="139700" imgH="215900" progId="Equation.DSMT4">
                   <p:embed/>
                 </p:oleObj>
               </mc:Choice>
@@ -18597,7 +18594,7 @@
           <a:graphicData uri="http://schemas.openxmlformats.org/presentationml/2006/ole">
             <mc:AlternateContent xmlns:mc="http://schemas.openxmlformats.org/markup-compatibility/2006">
               <mc:Choice xmlns:v="urn:schemas-microsoft-com:vml" Requires="v">
-                <p:oleObj spid="_x0000_s13348" name="Equation" r:id="rId8" imgW="1257300" imgH="685800" progId="Equation.DSMT4">
+                <p:oleObj spid="_x0000_s13352" name="Equation" r:id="rId8" imgW="1257300" imgH="685800" progId="Equation.DSMT4">
                   <p:embed/>
                 </p:oleObj>
               </mc:Choice>

</xml_diff>